<commit_message>
Modification note cadrage et ppt
</commit_message>
<xml_diff>
--- a/Presentation 29 avril V2.pptx
+++ b/Presentation 29 avril V2.pptx
@@ -8510,7 +8510,9 @@
         </p:nvSpPr>
         <p:spPr/>
         <p:txBody>
-          <a:bodyPr/>
+          <a:bodyPr>
+            <a:normAutofit fontScale="90000"/>
+          </a:bodyPr>
           <a:lstStyle/>
           <a:p>
             <a:r>
@@ -8519,7 +8521,18 @@
             </a:r>
             <a:r>
               <a:rPr lang="en-US" dirty="0" smtClean="0"/>
-              <a:t> Python</a:t>
+              <a:t> </a:t>
+            </a:r>
+            <a:r>
+              <a:rPr lang="en-US" dirty="0" smtClean="0"/>
+              <a:t>Python</a:t>
+            </a:r>
+            <a:br>
+              <a:rPr lang="en-US" dirty="0" smtClean="0"/>
+            </a:br>
+            <a:r>
+              <a:rPr lang="en-US" dirty="0" smtClean="0"/>
+              <a:t>Web Extractor</a:t>
             </a:r>
             <a:endParaRPr lang="en-US" dirty="0"/>
           </a:p>
@@ -8575,6 +8588,32 @@
               <a:t>Rieber</a:t>
             </a:r>
             <a:endParaRPr lang="en-US" sz="2000" dirty="0"/>
+          </a:p>
+        </p:txBody>
+      </p:sp>
+      <p:sp>
+        <p:nvSpPr>
+          <p:cNvPr id="4" name="ZoneTexte 3"/>
+          <p:cNvSpPr txBox="1"/>
+          <p:nvPr/>
+        </p:nvSpPr>
+        <p:spPr>
+          <a:xfrm>
+            <a:off x="5238371" y="5318381"/>
+            <a:ext cx="184666" cy="369332"/>
+          </a:xfrm>
+          <a:prstGeom prst="rect">
+            <a:avLst/>
+          </a:prstGeom>
+          <a:noFill/>
+        </p:spPr>
+        <p:txBody>
+          <a:bodyPr wrap="none" rtlCol="0">
+            <a:spAutoFit/>
+          </a:bodyPr>
+          <a:lstStyle/>
+          <a:p>
+            <a:endParaRPr lang="fr-FR" dirty="0"/>
           </a:p>
         </p:txBody>
       </p:sp>
@@ -8755,6 +8794,13 @@
   <p:clrMapOvr>
     <a:masterClrMapping/>
   </p:clrMapOvr>
+  <p:timing>
+    <p:tnLst>
+      <p:par>
+        <p:cTn xmlns:p14="http://schemas.microsoft.com/office/powerpoint/2010/main" id="1" dur="indefinite" restart="never" nodeType="tmRoot"/>
+      </p:par>
+    </p:tnLst>
+  </p:timing>
 </p:sld>
 </file>
 
@@ -8816,7 +8862,7 @@
         </p:spPr>
         <p:txBody>
           <a:bodyPr>
-            <a:normAutofit fontScale="92500" lnSpcReduction="20000"/>
+            <a:normAutofit fontScale="92500" lnSpcReduction="10000"/>
           </a:bodyPr>
           <a:lstStyle/>
           <a:p>
@@ -9031,25 +9077,15 @@
             </a:r>
             <a:r>
               <a:rPr lang="en-US" sz="1600" dirty="0" smtClean="0"/>
-              <a:t> du temps</a:t>
-            </a:r>
-          </a:p>
-          <a:p>
-            <a:pPr lvl="1">
-              <a:buFont typeface="Arial"/>
-              <a:buChar char="•"/>
-            </a:pPr>
-            <a:r>
-              <a:rPr lang="en-US" sz="1600" dirty="0" err="1" smtClean="0"/>
-              <a:t>Complexité</a:t>
-            </a:r>
-            <a:r>
-              <a:rPr lang="en-US" sz="1600" dirty="0" smtClean="0"/>
-              <a:t> de lecture des </a:t>
-            </a:r>
-            <a:r>
-              <a:rPr lang="en-US" sz="1600" dirty="0" err="1" smtClean="0"/>
-              <a:t>commentaires</a:t>
+              <a:t> </a:t>
+            </a:r>
+            <a:r>
+              <a:rPr lang="en-US" sz="1600" smtClean="0"/>
+              <a:t>du </a:t>
+            </a:r>
+            <a:r>
+              <a:rPr lang="en-US" sz="1600" smtClean="0"/>
+              <a:t>temps</a:t>
             </a:r>
             <a:endParaRPr lang="en-US" sz="1600" dirty="0" smtClean="0"/>
           </a:p>
@@ -9065,6 +9101,13 @@
   <p:clrMapOvr>
     <a:masterClrMapping/>
   </p:clrMapOvr>
+  <p:timing>
+    <p:tnLst>
+      <p:par>
+        <p:cTn xmlns:p14="http://schemas.microsoft.com/office/powerpoint/2010/main" id="1" dur="indefinite" restart="never" nodeType="tmRoot"/>
+      </p:par>
+    </p:tnLst>
+  </p:timing>
 </p:sld>
 </file>
 
@@ -9150,6 +9193,13 @@
   <p:clrMapOvr>
     <a:masterClrMapping/>
   </p:clrMapOvr>
+  <p:timing>
+    <p:tnLst>
+      <p:par>
+        <p:cTn xmlns:p14="http://schemas.microsoft.com/office/powerpoint/2010/main" id="1" dur="indefinite" restart="never" nodeType="tmRoot"/>
+      </p:par>
+    </p:tnLst>
+  </p:timing>
 </p:sld>
 </file>
 

</xml_diff>

<commit_message>
suite à la presentation
</commit_message>
<xml_diff>
--- a/Presentation 29 avril V2.pptx
+++ b/Presentation 29 avril V2.pptx
@@ -4,15 +4,20 @@
   <p:sldMasterIdLst>
     <p:sldMasterId id="2147483884" r:id="rId1"/>
   </p:sldMasterIdLst>
+  <p:notesMasterIdLst>
+    <p:notesMasterId r:id="rId12"/>
+  </p:notesMasterIdLst>
   <p:sldIdLst>
     <p:sldId id="256" r:id="rId2"/>
     <p:sldId id="257" r:id="rId3"/>
-    <p:sldId id="258" r:id="rId4"/>
-    <p:sldId id="259" r:id="rId5"/>
-    <p:sldId id="262" r:id="rId6"/>
-    <p:sldId id="263" r:id="rId7"/>
-    <p:sldId id="265" r:id="rId8"/>
-    <p:sldId id="260" r:id="rId9"/>
+    <p:sldId id="270" r:id="rId4"/>
+    <p:sldId id="268" r:id="rId5"/>
+    <p:sldId id="258" r:id="rId6"/>
+    <p:sldId id="259" r:id="rId7"/>
+    <p:sldId id="262" r:id="rId8"/>
+    <p:sldId id="263" r:id="rId9"/>
+    <p:sldId id="265" r:id="rId10"/>
+    <p:sldId id="260" r:id="rId11"/>
   </p:sldIdLst>
   <p:sldSz cx="9144000" cy="6858000" type="screen4x3"/>
   <p:notesSz cx="6858000" cy="9144000"/>
@@ -113,7 +118,7 @@
   </p:defaultTextStyle>
   <p:extLst>
     <p:ext uri="{EFAFB233-063F-42B5-8137-9DF3F51BA10A}">
-      <p15:sldGuideLst xmlns:p15="http://schemas.microsoft.com/office/powerpoint/2012/main" xmlns="">
+      <p15:sldGuideLst xmlns="" xmlns:p15="http://schemas.microsoft.com/office/powerpoint/2012/main">
         <p15:guide id="1" orient="horz" pos="2160">
           <p15:clr>
             <a:srgbClr val="A4A3A4"/>
@@ -128,6 +133,440 @@
     </p:ext>
   </p:extLst>
 </p:presentation>
+</file>
+
+<file path=ppt/notesMasters/notesMaster1.xml><?xml version="1.0" encoding="utf-8"?>
+<p:notesMaster xmlns:a="http://schemas.openxmlformats.org/drawingml/2006/main" xmlns:r="http://schemas.openxmlformats.org/officeDocument/2006/relationships" xmlns:p="http://schemas.openxmlformats.org/presentationml/2006/main">
+  <p:cSld>
+    <p:bg>
+      <p:bgRef idx="1001">
+        <a:schemeClr val="bg1"/>
+      </p:bgRef>
+    </p:bg>
+    <p:spTree>
+      <p:nvGrpSpPr>
+        <p:cNvPr id="1" name=""/>
+        <p:cNvGrpSpPr/>
+        <p:nvPr/>
+      </p:nvGrpSpPr>
+      <p:grpSpPr>
+        <a:xfrm>
+          <a:off x="0" y="0"/>
+          <a:ext cx="0" cy="0"/>
+          <a:chOff x="0" y="0"/>
+          <a:chExt cx="0" cy="0"/>
+        </a:xfrm>
+      </p:grpSpPr>
+      <p:sp>
+        <p:nvSpPr>
+          <p:cNvPr id="2" name="Espace réservé de l'en-tête 1"/>
+          <p:cNvSpPr>
+            <a:spLocks noGrp="1"/>
+          </p:cNvSpPr>
+          <p:nvPr>
+            <p:ph type="hdr" sz="quarter"/>
+          </p:nvPr>
+        </p:nvSpPr>
+        <p:spPr>
+          <a:xfrm>
+            <a:off x="0" y="0"/>
+            <a:ext cx="2971800" cy="457200"/>
+          </a:xfrm>
+          <a:prstGeom prst="rect">
+            <a:avLst/>
+          </a:prstGeom>
+        </p:spPr>
+        <p:txBody>
+          <a:bodyPr vert="horz" lIns="91440" tIns="45720" rIns="91440" bIns="45720" rtlCol="0"/>
+          <a:lstStyle>
+            <a:lvl1pPr algn="l">
+              <a:defRPr sz="1200"/>
+            </a:lvl1pPr>
+          </a:lstStyle>
+          <a:p>
+            <a:endParaRPr lang="fr-FR"/>
+          </a:p>
+        </p:txBody>
+      </p:sp>
+      <p:sp>
+        <p:nvSpPr>
+          <p:cNvPr id="3" name="Espace réservé de la date 2"/>
+          <p:cNvSpPr>
+            <a:spLocks noGrp="1"/>
+          </p:cNvSpPr>
+          <p:nvPr>
+            <p:ph type="dt" idx="1"/>
+          </p:nvPr>
+        </p:nvSpPr>
+        <p:spPr>
+          <a:xfrm>
+            <a:off x="3884613" y="0"/>
+            <a:ext cx="2971800" cy="457200"/>
+          </a:xfrm>
+          <a:prstGeom prst="rect">
+            <a:avLst/>
+          </a:prstGeom>
+        </p:spPr>
+        <p:txBody>
+          <a:bodyPr vert="horz" lIns="91440" tIns="45720" rIns="91440" bIns="45720" rtlCol="0"/>
+          <a:lstStyle>
+            <a:lvl1pPr algn="r">
+              <a:defRPr sz="1200"/>
+            </a:lvl1pPr>
+          </a:lstStyle>
+          <a:p>
+            <a:fld id="{4D2FE763-1D0A-6342-965B-9E22572E9E5B}" type="datetimeFigureOut">
+              <a:rPr lang="fr-FR" smtClean="0"/>
+              <a:t>29/04/16</a:t>
+            </a:fld>
+            <a:endParaRPr lang="fr-FR"/>
+          </a:p>
+        </p:txBody>
+      </p:sp>
+      <p:sp>
+        <p:nvSpPr>
+          <p:cNvPr id="4" name="Espace réservé de l'image des diapositives 3"/>
+          <p:cNvSpPr>
+            <a:spLocks noGrp="1" noRot="1" noChangeAspect="1"/>
+          </p:cNvSpPr>
+          <p:nvPr>
+            <p:ph type="sldImg" idx="2"/>
+          </p:nvPr>
+        </p:nvSpPr>
+        <p:spPr>
+          <a:xfrm>
+            <a:off x="1143000" y="685800"/>
+            <a:ext cx="4572000" cy="3429000"/>
+          </a:xfrm>
+          <a:prstGeom prst="rect">
+            <a:avLst/>
+          </a:prstGeom>
+          <a:noFill/>
+          <a:ln w="12700">
+            <a:solidFill>
+              <a:prstClr val="black"/>
+            </a:solidFill>
+          </a:ln>
+        </p:spPr>
+        <p:txBody>
+          <a:bodyPr vert="horz" lIns="91440" tIns="45720" rIns="91440" bIns="45720" rtlCol="0" anchor="ctr"/>
+          <a:lstStyle/>
+          <a:p>
+            <a:endParaRPr lang="fr-FR"/>
+          </a:p>
+        </p:txBody>
+      </p:sp>
+      <p:sp>
+        <p:nvSpPr>
+          <p:cNvPr id="5" name="Espace réservé des commentaires 4"/>
+          <p:cNvSpPr>
+            <a:spLocks noGrp="1"/>
+          </p:cNvSpPr>
+          <p:nvPr>
+            <p:ph type="body" sz="quarter" idx="3"/>
+          </p:nvPr>
+        </p:nvSpPr>
+        <p:spPr>
+          <a:xfrm>
+            <a:off x="685800" y="4343400"/>
+            <a:ext cx="5486400" cy="4114800"/>
+          </a:xfrm>
+          <a:prstGeom prst="rect">
+            <a:avLst/>
+          </a:prstGeom>
+        </p:spPr>
+        <p:txBody>
+          <a:bodyPr vert="horz" lIns="91440" tIns="45720" rIns="91440" bIns="45720" rtlCol="0"/>
+          <a:lstStyle/>
+          <a:p>
+            <a:pPr lvl="0"/>
+            <a:r>
+              <a:rPr lang="fr-FR" smtClean="0"/>
+              <a:t>Cliquez pour modifier les styles du texte du masque</a:t>
+            </a:r>
+          </a:p>
+          <a:p>
+            <a:pPr lvl="1"/>
+            <a:r>
+              <a:rPr lang="fr-FR" smtClean="0"/>
+              <a:t>Deuxième niveau</a:t>
+            </a:r>
+          </a:p>
+          <a:p>
+            <a:pPr lvl="2"/>
+            <a:r>
+              <a:rPr lang="fr-FR" smtClean="0"/>
+              <a:t>Troisième niveau</a:t>
+            </a:r>
+          </a:p>
+          <a:p>
+            <a:pPr lvl="3"/>
+            <a:r>
+              <a:rPr lang="fr-FR" smtClean="0"/>
+              <a:t>Quatrième niveau</a:t>
+            </a:r>
+          </a:p>
+          <a:p>
+            <a:pPr lvl="4"/>
+            <a:r>
+              <a:rPr lang="fr-FR" smtClean="0"/>
+              <a:t>Cinquième niveau</a:t>
+            </a:r>
+            <a:endParaRPr lang="fr-FR"/>
+          </a:p>
+        </p:txBody>
+      </p:sp>
+      <p:sp>
+        <p:nvSpPr>
+          <p:cNvPr id="6" name="Espace réservé du pied de page 5"/>
+          <p:cNvSpPr>
+            <a:spLocks noGrp="1"/>
+          </p:cNvSpPr>
+          <p:nvPr>
+            <p:ph type="ftr" sz="quarter" idx="4"/>
+          </p:nvPr>
+        </p:nvSpPr>
+        <p:spPr>
+          <a:xfrm>
+            <a:off x="0" y="8685213"/>
+            <a:ext cx="2971800" cy="457200"/>
+          </a:xfrm>
+          <a:prstGeom prst="rect">
+            <a:avLst/>
+          </a:prstGeom>
+        </p:spPr>
+        <p:txBody>
+          <a:bodyPr vert="horz" lIns="91440" tIns="45720" rIns="91440" bIns="45720" rtlCol="0" anchor="b"/>
+          <a:lstStyle>
+            <a:lvl1pPr algn="l">
+              <a:defRPr sz="1200"/>
+            </a:lvl1pPr>
+          </a:lstStyle>
+          <a:p>
+            <a:endParaRPr lang="fr-FR"/>
+          </a:p>
+        </p:txBody>
+      </p:sp>
+      <p:sp>
+        <p:nvSpPr>
+          <p:cNvPr id="7" name="Espace réservé du numéro de diapositive 6"/>
+          <p:cNvSpPr>
+            <a:spLocks noGrp="1"/>
+          </p:cNvSpPr>
+          <p:nvPr>
+            <p:ph type="sldNum" sz="quarter" idx="5"/>
+          </p:nvPr>
+        </p:nvSpPr>
+        <p:spPr>
+          <a:xfrm>
+            <a:off x="3884613" y="8685213"/>
+            <a:ext cx="2971800" cy="457200"/>
+          </a:xfrm>
+          <a:prstGeom prst="rect">
+            <a:avLst/>
+          </a:prstGeom>
+        </p:spPr>
+        <p:txBody>
+          <a:bodyPr vert="horz" lIns="91440" tIns="45720" rIns="91440" bIns="45720" rtlCol="0" anchor="b"/>
+          <a:lstStyle>
+            <a:lvl1pPr algn="r">
+              <a:defRPr sz="1200"/>
+            </a:lvl1pPr>
+          </a:lstStyle>
+          <a:p>
+            <a:fld id="{95D089D2-D152-9C42-A1FF-0DC7FC3BA91F}" type="slidenum">
+              <a:rPr lang="fr-FR" smtClean="0"/>
+              <a:t>‹#›</a:t>
+            </a:fld>
+            <a:endParaRPr lang="fr-FR"/>
+          </a:p>
+        </p:txBody>
+      </p:sp>
+    </p:spTree>
+    <p:extLst>
+      <p:ext uri="{BB962C8B-B14F-4D97-AF65-F5344CB8AC3E}">
+        <p14:creationId xmlns:p14="http://schemas.microsoft.com/office/powerpoint/2010/main" val="435352463"/>
+      </p:ext>
+    </p:extLst>
+  </p:cSld>
+  <p:clrMap bg1="lt1" tx1="dk1" bg2="lt2" tx2="dk2" accent1="accent1" accent2="accent2" accent3="accent3" accent4="accent4" accent5="accent5" accent6="accent6" hlink="hlink" folHlink="folHlink"/>
+  <p:notesStyle>
+    <a:lvl1pPr marL="0" algn="l" defTabSz="457200" rtl="0" eaLnBrk="1" latinLnBrk="0" hangingPunct="1">
+      <a:defRPr sz="1200" kern="1200">
+        <a:solidFill>
+          <a:schemeClr val="tx1"/>
+        </a:solidFill>
+        <a:latin typeface="+mn-lt"/>
+        <a:ea typeface="+mn-ea"/>
+        <a:cs typeface="+mn-cs"/>
+      </a:defRPr>
+    </a:lvl1pPr>
+    <a:lvl2pPr marL="457200" algn="l" defTabSz="457200" rtl="0" eaLnBrk="1" latinLnBrk="0" hangingPunct="1">
+      <a:defRPr sz="1200" kern="1200">
+        <a:solidFill>
+          <a:schemeClr val="tx1"/>
+        </a:solidFill>
+        <a:latin typeface="+mn-lt"/>
+        <a:ea typeface="+mn-ea"/>
+        <a:cs typeface="+mn-cs"/>
+      </a:defRPr>
+    </a:lvl2pPr>
+    <a:lvl3pPr marL="914400" algn="l" defTabSz="457200" rtl="0" eaLnBrk="1" latinLnBrk="0" hangingPunct="1">
+      <a:defRPr sz="1200" kern="1200">
+        <a:solidFill>
+          <a:schemeClr val="tx1"/>
+        </a:solidFill>
+        <a:latin typeface="+mn-lt"/>
+        <a:ea typeface="+mn-ea"/>
+        <a:cs typeface="+mn-cs"/>
+      </a:defRPr>
+    </a:lvl3pPr>
+    <a:lvl4pPr marL="1371600" algn="l" defTabSz="457200" rtl="0" eaLnBrk="1" latinLnBrk="0" hangingPunct="1">
+      <a:defRPr sz="1200" kern="1200">
+        <a:solidFill>
+          <a:schemeClr val="tx1"/>
+        </a:solidFill>
+        <a:latin typeface="+mn-lt"/>
+        <a:ea typeface="+mn-ea"/>
+        <a:cs typeface="+mn-cs"/>
+      </a:defRPr>
+    </a:lvl4pPr>
+    <a:lvl5pPr marL="1828800" algn="l" defTabSz="457200" rtl="0" eaLnBrk="1" latinLnBrk="0" hangingPunct="1">
+      <a:defRPr sz="1200" kern="1200">
+        <a:solidFill>
+          <a:schemeClr val="tx1"/>
+        </a:solidFill>
+        <a:latin typeface="+mn-lt"/>
+        <a:ea typeface="+mn-ea"/>
+        <a:cs typeface="+mn-cs"/>
+      </a:defRPr>
+    </a:lvl5pPr>
+    <a:lvl6pPr marL="2286000" algn="l" defTabSz="457200" rtl="0" eaLnBrk="1" latinLnBrk="0" hangingPunct="1">
+      <a:defRPr sz="1200" kern="1200">
+        <a:solidFill>
+          <a:schemeClr val="tx1"/>
+        </a:solidFill>
+        <a:latin typeface="+mn-lt"/>
+        <a:ea typeface="+mn-ea"/>
+        <a:cs typeface="+mn-cs"/>
+      </a:defRPr>
+    </a:lvl6pPr>
+    <a:lvl7pPr marL="2743200" algn="l" defTabSz="457200" rtl="0" eaLnBrk="1" latinLnBrk="0" hangingPunct="1">
+      <a:defRPr sz="1200" kern="1200">
+        <a:solidFill>
+          <a:schemeClr val="tx1"/>
+        </a:solidFill>
+        <a:latin typeface="+mn-lt"/>
+        <a:ea typeface="+mn-ea"/>
+        <a:cs typeface="+mn-cs"/>
+      </a:defRPr>
+    </a:lvl7pPr>
+    <a:lvl8pPr marL="3200400" algn="l" defTabSz="457200" rtl="0" eaLnBrk="1" latinLnBrk="0" hangingPunct="1">
+      <a:defRPr sz="1200" kern="1200">
+        <a:solidFill>
+          <a:schemeClr val="tx1"/>
+        </a:solidFill>
+        <a:latin typeface="+mn-lt"/>
+        <a:ea typeface="+mn-ea"/>
+        <a:cs typeface="+mn-cs"/>
+      </a:defRPr>
+    </a:lvl8pPr>
+    <a:lvl9pPr marL="3657600" algn="l" defTabSz="457200" rtl="0" eaLnBrk="1" latinLnBrk="0" hangingPunct="1">
+      <a:defRPr sz="1200" kern="1200">
+        <a:solidFill>
+          <a:schemeClr val="tx1"/>
+        </a:solidFill>
+        <a:latin typeface="+mn-lt"/>
+        <a:ea typeface="+mn-ea"/>
+        <a:cs typeface="+mn-cs"/>
+      </a:defRPr>
+    </a:lvl9pPr>
+  </p:notesStyle>
+</p:notesMaster>
+</file>
+
+<file path=ppt/notesSlides/notesSlide1.xml><?xml version="1.0" encoding="utf-8"?>
+<p:notes xmlns:a="http://schemas.openxmlformats.org/drawingml/2006/main" xmlns:r="http://schemas.openxmlformats.org/officeDocument/2006/relationships" xmlns:p="http://schemas.openxmlformats.org/presentationml/2006/main">
+  <p:cSld>
+    <p:spTree>
+      <p:nvGrpSpPr>
+        <p:cNvPr id="1" name=""/>
+        <p:cNvGrpSpPr/>
+        <p:nvPr/>
+      </p:nvGrpSpPr>
+      <p:grpSpPr>
+        <a:xfrm>
+          <a:off x="0" y="0"/>
+          <a:ext cx="0" cy="0"/>
+          <a:chOff x="0" y="0"/>
+          <a:chExt cx="0" cy="0"/>
+        </a:xfrm>
+      </p:grpSpPr>
+      <p:sp>
+        <p:nvSpPr>
+          <p:cNvPr id="2" name="Espace réservé de l'image des diapositives 1"/>
+          <p:cNvSpPr>
+            <a:spLocks noGrp="1" noRot="1" noChangeAspect="1"/>
+          </p:cNvSpPr>
+          <p:nvPr>
+            <p:ph type="sldImg"/>
+          </p:nvPr>
+        </p:nvSpPr>
+        <p:spPr/>
+      </p:sp>
+      <p:sp>
+        <p:nvSpPr>
+          <p:cNvPr id="3" name="Espace réservé des commentaires 2"/>
+          <p:cNvSpPr>
+            <a:spLocks noGrp="1"/>
+          </p:cNvSpPr>
+          <p:nvPr>
+            <p:ph type="body" idx="1"/>
+          </p:nvPr>
+        </p:nvSpPr>
+        <p:spPr/>
+        <p:txBody>
+          <a:bodyPr/>
+          <a:lstStyle/>
+          <a:p>
+            <a:endParaRPr lang="fr-FR" dirty="0"/>
+          </a:p>
+        </p:txBody>
+      </p:sp>
+      <p:sp>
+        <p:nvSpPr>
+          <p:cNvPr id="4" name="Espace réservé du numéro de diapositive 3"/>
+          <p:cNvSpPr>
+            <a:spLocks noGrp="1"/>
+          </p:cNvSpPr>
+          <p:nvPr>
+            <p:ph type="sldNum" sz="quarter" idx="10"/>
+          </p:nvPr>
+        </p:nvSpPr>
+        <p:spPr/>
+        <p:txBody>
+          <a:bodyPr/>
+          <a:lstStyle/>
+          <a:p>
+            <a:fld id="{95D089D2-D152-9C42-A1FF-0DC7FC3BA91F}" type="slidenum">
+              <a:rPr lang="fr-FR" smtClean="0"/>
+              <a:t>6</a:t>
+            </a:fld>
+            <a:endParaRPr lang="fr-FR"/>
+          </a:p>
+        </p:txBody>
+      </p:sp>
+    </p:spTree>
+    <p:extLst>
+      <p:ext uri="{BB962C8B-B14F-4D97-AF65-F5344CB8AC3E}">
+        <p14:creationId xmlns:p14="http://schemas.microsoft.com/office/powerpoint/2010/main" val="431131459"/>
+      </p:ext>
+    </p:extLst>
+  </p:cSld>
+  <p:clrMapOvr>
+    <a:masterClrMapping/>
+  </p:clrMapOvr>
+</p:notes>
 </file>
 
 <file path=ppt/slideLayouts/slideLayout1.xml><?xml version="1.0" encoding="utf-8"?>
@@ -8521,11 +8960,7 @@
             </a:r>
             <a:r>
               <a:rPr lang="en-US" dirty="0" smtClean="0"/>
-              <a:t> </a:t>
-            </a:r>
-            <a:r>
-              <a:rPr lang="en-US" dirty="0" smtClean="0"/>
-              <a:t>Python</a:t>
+              <a:t> Python</a:t>
             </a:r>
             <a:br>
               <a:rPr lang="en-US" dirty="0" smtClean="0"/>
@@ -8601,10 +9036,17 @@
   <p:clrMapOvr>
     <a:masterClrMapping/>
   </p:clrMapOvr>
+  <p:timing>
+    <p:tnLst>
+      <p:par>
+        <p:cTn xmlns:p14="http://schemas.microsoft.com/office/powerpoint/2010/main" id="1" dur="indefinite" restart="never" nodeType="tmRoot"/>
+      </p:par>
+    </p:tnLst>
+  </p:timing>
 </p:sld>
 </file>
 
-<file path=ppt/slides/slide2.xml><?xml version="1.0" encoding="utf-8"?>
+<file path=ppt/slides/slide10.xml><?xml version="1.0" encoding="utf-8"?>
 <p:sld xmlns:a="http://schemas.openxmlformats.org/drawingml/2006/main" xmlns:r="http://schemas.openxmlformats.org/officeDocument/2006/relationships" xmlns:p="http://schemas.openxmlformats.org/presentationml/2006/main">
   <p:cSld>
     <p:spTree>
@@ -8638,819 +9080,6 @@
           <a:p>
             <a:r>
               <a:rPr lang="en-US" dirty="0" smtClean="0"/>
-              <a:t>SOMMAIRE</a:t>
-            </a:r>
-            <a:endParaRPr lang="en-US" dirty="0"/>
-          </a:p>
-        </p:txBody>
-      </p:sp>
-      <p:sp>
-        <p:nvSpPr>
-          <p:cNvPr id="3" name="Content Placeholder 2"/>
-          <p:cNvSpPr>
-            <a:spLocks noGrp="1"/>
-          </p:cNvSpPr>
-          <p:nvPr>
-            <p:ph idx="1"/>
-          </p:nvPr>
-        </p:nvSpPr>
-        <p:spPr/>
-        <p:txBody>
-          <a:bodyPr/>
-          <a:lstStyle/>
-          <a:p>
-            <a:pPr>
-              <a:buFont typeface="Wingdings" charset="2"/>
-              <a:buChar char="Ø"/>
-            </a:pPr>
-            <a:r>
-              <a:rPr lang="en-US" dirty="0" smtClean="0"/>
-              <a:t>Note de </a:t>
-            </a:r>
-            <a:r>
-              <a:rPr lang="en-US" dirty="0" err="1" smtClean="0"/>
-              <a:t>cadrage</a:t>
-            </a:r>
-            <a:endParaRPr lang="en-US" dirty="0" smtClean="0"/>
-          </a:p>
-          <a:p>
-            <a:pPr>
-              <a:buFont typeface="Wingdings" charset="2"/>
-              <a:buChar char="Ø"/>
-            </a:pPr>
-            <a:r>
-              <a:rPr lang="en-US" dirty="0" err="1" smtClean="0"/>
-              <a:t>Spécifications</a:t>
-            </a:r>
-            <a:r>
-              <a:rPr lang="en-US" dirty="0" smtClean="0"/>
-              <a:t> </a:t>
-            </a:r>
-            <a:r>
-              <a:rPr lang="en-US" dirty="0" err="1" smtClean="0"/>
-              <a:t>générales</a:t>
-            </a:r>
-            <a:endParaRPr lang="en-US" dirty="0" smtClean="0"/>
-          </a:p>
-          <a:p>
-            <a:pPr lvl="1">
-              <a:buFont typeface="Wingdings" charset="2"/>
-              <a:buChar char="ü"/>
-            </a:pPr>
-            <a:r>
-              <a:rPr lang="en-US" dirty="0" err="1" smtClean="0"/>
-              <a:t>Diagramme</a:t>
-            </a:r>
-            <a:r>
-              <a:rPr lang="en-US" dirty="0" smtClean="0"/>
-              <a:t> de classes</a:t>
-            </a:r>
-          </a:p>
-          <a:p>
-            <a:pPr lvl="1">
-              <a:buFont typeface="Wingdings" charset="2"/>
-              <a:buChar char="ü"/>
-            </a:pPr>
-            <a:r>
-              <a:rPr lang="en-US" dirty="0" smtClean="0"/>
-              <a:t>Uses cases: </a:t>
-            </a:r>
-          </a:p>
-          <a:p>
-            <a:pPr lvl="2">
-              <a:buFont typeface="Arial"/>
-              <a:buChar char="•"/>
-            </a:pPr>
-            <a:r>
-              <a:rPr lang="en-US" dirty="0" err="1" smtClean="0"/>
-              <a:t>Spécifications</a:t>
-            </a:r>
-            <a:r>
-              <a:rPr lang="en-US" dirty="0" smtClean="0"/>
-              <a:t> </a:t>
-            </a:r>
-            <a:r>
-              <a:rPr lang="en-US" dirty="0" err="1" smtClean="0"/>
-              <a:t>détaillées</a:t>
-            </a:r>
-            <a:endParaRPr lang="en-US" dirty="0" smtClean="0"/>
-          </a:p>
-          <a:p>
-            <a:pPr lvl="2">
-              <a:buFont typeface="Arial"/>
-              <a:buChar char="•"/>
-            </a:pPr>
-            <a:r>
-              <a:rPr lang="en-US" dirty="0" err="1" smtClean="0"/>
-              <a:t>Chiffrage</a:t>
-            </a:r>
-            <a:endParaRPr lang="en-US" dirty="0" smtClean="0"/>
-          </a:p>
-          <a:p>
-            <a:pPr lvl="2">
-              <a:buFont typeface="Arial"/>
-              <a:buChar char="•"/>
-            </a:pPr>
-            <a:r>
-              <a:rPr lang="en-US" dirty="0" smtClean="0"/>
-              <a:t>Gantt</a:t>
-            </a:r>
-          </a:p>
-        </p:txBody>
-      </p:sp>
-    </p:spTree>
-    <p:extLst>
-      <p:ext uri="{BB962C8B-B14F-4D97-AF65-F5344CB8AC3E}">
-        <p14:creationId xmlns:p14="http://schemas.microsoft.com/office/powerpoint/2010/main" val="1718126266"/>
-      </p:ext>
-    </p:extLst>
-  </p:cSld>
-  <p:clrMapOvr>
-    <a:masterClrMapping/>
-  </p:clrMapOvr>
-</p:sld>
-</file>
-
-<file path=ppt/slides/slide3.xml><?xml version="1.0" encoding="utf-8"?>
-<p:sld xmlns:a="http://schemas.openxmlformats.org/drawingml/2006/main" xmlns:r="http://schemas.openxmlformats.org/officeDocument/2006/relationships" xmlns:p="http://schemas.openxmlformats.org/presentationml/2006/main">
-  <p:cSld>
-    <p:spTree>
-      <p:nvGrpSpPr>
-        <p:cNvPr id="1" name=""/>
-        <p:cNvGrpSpPr/>
-        <p:nvPr/>
-      </p:nvGrpSpPr>
-      <p:grpSpPr>
-        <a:xfrm>
-          <a:off x="0" y="0"/>
-          <a:ext cx="0" cy="0"/>
-          <a:chOff x="0" y="0"/>
-          <a:chExt cx="0" cy="0"/>
-        </a:xfrm>
-      </p:grpSpPr>
-      <p:sp>
-        <p:nvSpPr>
-          <p:cNvPr id="2" name="Title 1"/>
-          <p:cNvSpPr>
-            <a:spLocks noGrp="1"/>
-          </p:cNvSpPr>
-          <p:nvPr>
-            <p:ph type="title"/>
-          </p:nvPr>
-        </p:nvSpPr>
-        <p:spPr/>
-        <p:txBody>
-          <a:bodyPr/>
-          <a:lstStyle/>
-          <a:p>
-            <a:r>
-              <a:rPr lang="en-US" dirty="0" smtClean="0"/>
-              <a:t>NOTE DE CADRAGE</a:t>
-            </a:r>
-            <a:endParaRPr lang="en-US" dirty="0"/>
-          </a:p>
-        </p:txBody>
-      </p:sp>
-      <p:sp>
-        <p:nvSpPr>
-          <p:cNvPr id="3" name="Content Placeholder 2"/>
-          <p:cNvSpPr>
-            <a:spLocks noGrp="1"/>
-          </p:cNvSpPr>
-          <p:nvPr>
-            <p:ph idx="1"/>
-          </p:nvPr>
-        </p:nvSpPr>
-        <p:spPr>
-          <a:xfrm>
-            <a:off x="204377" y="2335515"/>
-            <a:ext cx="8817362" cy="3886200"/>
-          </a:xfrm>
-        </p:spPr>
-        <p:txBody>
-          <a:bodyPr>
-            <a:normAutofit fontScale="92500" lnSpcReduction="10000"/>
-          </a:bodyPr>
-          <a:lstStyle/>
-          <a:p>
-            <a:pPr>
-              <a:buFont typeface="Wingdings" charset="2"/>
-              <a:buChar char="Ø"/>
-            </a:pPr>
-            <a:r>
-              <a:rPr lang="en-US" dirty="0" smtClean="0"/>
-              <a:t>ENJEUX </a:t>
-            </a:r>
-            <a:r>
-              <a:rPr lang="en-US" sz="1600" dirty="0" err="1" smtClean="0"/>
-              <a:t>Visualisation</a:t>
-            </a:r>
-            <a:endParaRPr lang="en-US" sz="1600" dirty="0" smtClean="0"/>
-          </a:p>
-          <a:p>
-            <a:pPr>
-              <a:buFont typeface="Wingdings" charset="2"/>
-              <a:buChar char="Ø"/>
-            </a:pPr>
-            <a:r>
-              <a:rPr lang="en-US" dirty="0" smtClean="0"/>
-              <a:t>OBJECTIFS </a:t>
-            </a:r>
-            <a:r>
-              <a:rPr lang="en-US" sz="1600" dirty="0" err="1" smtClean="0"/>
-              <a:t>Analyse</a:t>
-            </a:r>
-            <a:r>
-              <a:rPr lang="en-US" sz="1600" dirty="0" smtClean="0"/>
-              <a:t> du </a:t>
-            </a:r>
-            <a:r>
-              <a:rPr lang="en-US" sz="1600" dirty="0" err="1" smtClean="0"/>
-              <a:t>contenu</a:t>
-            </a:r>
-            <a:r>
-              <a:rPr lang="en-US" sz="1600" dirty="0" smtClean="0"/>
-              <a:t> des </a:t>
-            </a:r>
-            <a:r>
-              <a:rPr lang="en-US" sz="1600" dirty="0" err="1" smtClean="0"/>
-              <a:t>commentaires</a:t>
-            </a:r>
-            <a:r>
-              <a:rPr lang="en-US" sz="1600" dirty="0" smtClean="0"/>
-              <a:t> </a:t>
-            </a:r>
-            <a:r>
-              <a:rPr lang="en-US" sz="1600" dirty="0" smtClean="0"/>
-              <a:t>d’un site </a:t>
-            </a:r>
-            <a:r>
-              <a:rPr lang="en-US" sz="1600" dirty="0" err="1" smtClean="0"/>
-              <a:t>marchand</a:t>
-            </a:r>
-            <a:r>
-              <a:rPr lang="en-US" sz="1600" dirty="0" smtClean="0"/>
-              <a:t> </a:t>
-            </a:r>
-            <a:r>
-              <a:rPr lang="en-US" sz="1600" dirty="0" smtClean="0"/>
-              <a:t>de prêt-à-porter</a:t>
-            </a:r>
-          </a:p>
-          <a:p>
-            <a:pPr>
-              <a:buFont typeface="Wingdings" charset="2"/>
-              <a:buChar char="Ø"/>
-            </a:pPr>
-            <a:r>
-              <a:rPr lang="en-US" dirty="0" smtClean="0"/>
-              <a:t>PRIORITÉS </a:t>
-            </a:r>
-          </a:p>
-          <a:p>
-            <a:pPr lvl="1">
-              <a:buFont typeface="Arial"/>
-              <a:buChar char="•"/>
-            </a:pPr>
-            <a:r>
-              <a:rPr lang="en-US" sz="1600" dirty="0" err="1" smtClean="0"/>
-              <a:t>Représentation</a:t>
-            </a:r>
-            <a:r>
-              <a:rPr lang="en-US" sz="1600" dirty="0" smtClean="0"/>
-              <a:t> </a:t>
-            </a:r>
-            <a:r>
-              <a:rPr lang="en-US" sz="1600" dirty="0" err="1" smtClean="0"/>
-              <a:t>visuelle</a:t>
-            </a:r>
-            <a:endParaRPr lang="en-US" sz="1600" dirty="0" smtClean="0"/>
-          </a:p>
-          <a:p>
-            <a:pPr lvl="1">
-              <a:buFont typeface="Arial"/>
-              <a:buChar char="•"/>
-            </a:pPr>
-            <a:r>
-              <a:rPr lang="en-US" sz="1600" dirty="0" err="1" smtClean="0"/>
-              <a:t>Analyse</a:t>
-            </a:r>
-            <a:r>
-              <a:rPr lang="en-US" sz="1600" dirty="0" smtClean="0"/>
-              <a:t> </a:t>
-            </a:r>
-            <a:r>
-              <a:rPr lang="en-US" sz="1600" dirty="0" err="1" smtClean="0"/>
-              <a:t>sémantique</a:t>
-            </a:r>
-            <a:endParaRPr lang="en-US" sz="1600" dirty="0" smtClean="0"/>
-          </a:p>
-          <a:p>
-            <a:pPr lvl="1">
-              <a:buFont typeface="Arial"/>
-              <a:buChar char="•"/>
-            </a:pPr>
-            <a:r>
-              <a:rPr lang="en-US" sz="1600" dirty="0" err="1" smtClean="0"/>
-              <a:t>Gestion</a:t>
-            </a:r>
-            <a:r>
-              <a:rPr lang="en-US" sz="1600" dirty="0" smtClean="0"/>
-              <a:t> </a:t>
-            </a:r>
-            <a:r>
-              <a:rPr lang="en-US" sz="1600" dirty="0" err="1" smtClean="0"/>
-              <a:t>d’une</a:t>
-            </a:r>
-            <a:r>
-              <a:rPr lang="en-US" sz="1600" dirty="0" smtClean="0"/>
-              <a:t> </a:t>
-            </a:r>
-            <a:r>
-              <a:rPr lang="en-US" sz="1600" dirty="0" err="1" smtClean="0"/>
-              <a:t>mauvaise</a:t>
-            </a:r>
-            <a:r>
-              <a:rPr lang="en-US" sz="1600" dirty="0" smtClean="0"/>
-              <a:t> entrée</a:t>
-            </a:r>
-          </a:p>
-          <a:p>
-            <a:pPr>
-              <a:buFont typeface="Wingdings" charset="2"/>
-              <a:buChar char="Ø"/>
-            </a:pPr>
-            <a:r>
-              <a:rPr lang="en-US" dirty="0" smtClean="0"/>
-              <a:t>DEFINITION DE L’ORGANISATION </a:t>
-            </a:r>
-            <a:r>
-              <a:rPr lang="en-US" sz="1600" dirty="0" err="1" smtClean="0"/>
-              <a:t>Répartition</a:t>
-            </a:r>
-            <a:r>
-              <a:rPr lang="en-US" sz="1600" dirty="0" smtClean="0"/>
-              <a:t> des </a:t>
-            </a:r>
-            <a:r>
-              <a:rPr lang="en-US" sz="1600" dirty="0" err="1" smtClean="0"/>
-              <a:t>tâches</a:t>
-            </a:r>
-            <a:r>
-              <a:rPr lang="en-US" sz="1600" dirty="0" smtClean="0"/>
-              <a:t> </a:t>
-            </a:r>
-            <a:r>
-              <a:rPr lang="en-US" sz="1600" dirty="0" err="1" smtClean="0"/>
-              <a:t>dans</a:t>
-            </a:r>
-            <a:r>
-              <a:rPr lang="en-US" sz="1600" dirty="0" smtClean="0"/>
-              <a:t> </a:t>
-            </a:r>
-            <a:r>
-              <a:rPr lang="en-US" sz="1600" dirty="0" err="1" smtClean="0"/>
-              <a:t>chaque</a:t>
-            </a:r>
-            <a:r>
-              <a:rPr lang="en-US" sz="1600" dirty="0" smtClean="0"/>
-              <a:t> phase </a:t>
-            </a:r>
-          </a:p>
-          <a:p>
-            <a:pPr>
-              <a:buFont typeface="Wingdings" charset="2"/>
-              <a:buChar char="Ø"/>
-            </a:pPr>
-            <a:r>
-              <a:rPr lang="en-US" dirty="0" smtClean="0"/>
-              <a:t>PRINCIPAUX RISQUES</a:t>
-            </a:r>
-          </a:p>
-          <a:p>
-            <a:pPr lvl="1">
-              <a:buFont typeface="Arial"/>
-              <a:buChar char="•"/>
-            </a:pPr>
-            <a:r>
-              <a:rPr lang="en-US" sz="1600" dirty="0" err="1" smtClean="0"/>
-              <a:t>Langage</a:t>
-            </a:r>
-            <a:r>
-              <a:rPr lang="en-US" sz="1600" dirty="0" smtClean="0"/>
-              <a:t> naturel</a:t>
-            </a:r>
-          </a:p>
-          <a:p>
-            <a:pPr lvl="1">
-              <a:buFont typeface="Arial"/>
-              <a:buChar char="•"/>
-            </a:pPr>
-            <a:r>
-              <a:rPr lang="en-US" sz="1600" dirty="0" err="1" smtClean="0"/>
-              <a:t>Gestion</a:t>
-            </a:r>
-            <a:r>
-              <a:rPr lang="en-US" sz="1600" dirty="0" smtClean="0"/>
-              <a:t> du </a:t>
-            </a:r>
-            <a:r>
-              <a:rPr lang="en-US" sz="1600" dirty="0" smtClean="0"/>
-              <a:t>temps</a:t>
-            </a:r>
-            <a:endParaRPr lang="en-US" sz="1600" dirty="0" smtClean="0"/>
-          </a:p>
-        </p:txBody>
-      </p:sp>
-    </p:spTree>
-    <p:extLst>
-      <p:ext uri="{BB962C8B-B14F-4D97-AF65-F5344CB8AC3E}">
-        <p14:creationId xmlns:p14="http://schemas.microsoft.com/office/powerpoint/2010/main" val="1366717793"/>
-      </p:ext>
-    </p:extLst>
-  </p:cSld>
-  <p:clrMapOvr>
-    <a:masterClrMapping/>
-  </p:clrMapOvr>
-</p:sld>
-</file>
-
-<file path=ppt/slides/slide4.xml><?xml version="1.0" encoding="utf-8"?>
-<p:sld xmlns:a="http://schemas.openxmlformats.org/drawingml/2006/main" xmlns:r="http://schemas.openxmlformats.org/officeDocument/2006/relationships" xmlns:p="http://schemas.openxmlformats.org/presentationml/2006/main">
-  <p:cSld>
-    <p:spTree>
-      <p:nvGrpSpPr>
-        <p:cNvPr id="1" name=""/>
-        <p:cNvGrpSpPr/>
-        <p:nvPr/>
-      </p:nvGrpSpPr>
-      <p:grpSpPr>
-        <a:xfrm>
-          <a:off x="0" y="0"/>
-          <a:ext cx="0" cy="0"/>
-          <a:chOff x="0" y="0"/>
-          <a:chExt cx="0" cy="0"/>
-        </a:xfrm>
-      </p:grpSpPr>
-      <p:sp>
-        <p:nvSpPr>
-          <p:cNvPr id="2" name="Title 1"/>
-          <p:cNvSpPr>
-            <a:spLocks noGrp="1"/>
-          </p:cNvSpPr>
-          <p:nvPr>
-            <p:ph type="title"/>
-          </p:nvPr>
-        </p:nvSpPr>
-        <p:spPr/>
-        <p:txBody>
-          <a:bodyPr>
-            <a:normAutofit/>
-          </a:bodyPr>
-          <a:lstStyle/>
-          <a:p>
-            <a:r>
-              <a:rPr lang="en-US" dirty="0" smtClean="0"/>
-              <a:t>DIAGRAMME DES CLASSES</a:t>
-            </a:r>
-            <a:endParaRPr lang="en-US" dirty="0"/>
-          </a:p>
-        </p:txBody>
-      </p:sp>
-      <p:pic>
-        <p:nvPicPr>
-          <p:cNvPr id="3" name="Image 2" descr="diagClasses.png"/>
-          <p:cNvPicPr>
-            <a:picLocks noChangeAspect="1"/>
-          </p:cNvPicPr>
-          <p:nvPr/>
-        </p:nvPicPr>
-        <p:blipFill>
-          <a:blip r:embed="rId2">
-            <a:extLst>
-              <a:ext uri="{28A0092B-C50C-407E-A947-70E740481C1C}">
-                <a14:useLocalDpi xmlns:a14="http://schemas.microsoft.com/office/drawing/2010/main" val="0"/>
-              </a:ext>
-            </a:extLst>
-          </a:blip>
-          <a:stretch>
-            <a:fillRect/>
-          </a:stretch>
-        </p:blipFill>
-        <p:spPr>
-          <a:xfrm>
-            <a:off x="1943077" y="1213334"/>
-            <a:ext cx="4895907" cy="5530366"/>
-          </a:xfrm>
-          <a:prstGeom prst="rect">
-            <a:avLst/>
-          </a:prstGeom>
-        </p:spPr>
-      </p:pic>
-    </p:spTree>
-    <p:extLst>
-      <p:ext uri="{BB962C8B-B14F-4D97-AF65-F5344CB8AC3E}">
-        <p14:creationId xmlns:p14="http://schemas.microsoft.com/office/powerpoint/2010/main" val="1514672248"/>
-      </p:ext>
-    </p:extLst>
-  </p:cSld>
-  <p:clrMapOvr>
-    <a:masterClrMapping/>
-  </p:clrMapOvr>
-</p:sld>
-</file>
-
-<file path=ppt/slides/slide5.xml><?xml version="1.0" encoding="utf-8"?>
-<p:sld xmlns:a="http://schemas.openxmlformats.org/drawingml/2006/main" xmlns:r="http://schemas.openxmlformats.org/officeDocument/2006/relationships" xmlns:p="http://schemas.openxmlformats.org/presentationml/2006/main">
-  <p:cSld>
-    <p:spTree>
-      <p:nvGrpSpPr>
-        <p:cNvPr id="1" name=""/>
-        <p:cNvGrpSpPr/>
-        <p:nvPr/>
-      </p:nvGrpSpPr>
-      <p:grpSpPr>
-        <a:xfrm>
-          <a:off x="0" y="0"/>
-          <a:ext cx="0" cy="0"/>
-          <a:chOff x="0" y="0"/>
-          <a:chExt cx="0" cy="0"/>
-        </a:xfrm>
-      </p:grpSpPr>
-      <p:sp>
-        <p:nvSpPr>
-          <p:cNvPr id="2" name="Title 1"/>
-          <p:cNvSpPr>
-            <a:spLocks noGrp="1"/>
-          </p:cNvSpPr>
-          <p:nvPr>
-            <p:ph type="title"/>
-          </p:nvPr>
-        </p:nvSpPr>
-        <p:spPr/>
-        <p:txBody>
-          <a:bodyPr/>
-          <a:lstStyle/>
-          <a:p>
-            <a:r>
-              <a:rPr lang="en-US" dirty="0" smtClean="0"/>
-              <a:t>USE CASE</a:t>
-            </a:r>
-            <a:endParaRPr lang="en-US" dirty="0"/>
-          </a:p>
-        </p:txBody>
-      </p:sp>
-      <p:pic>
-        <p:nvPicPr>
-          <p:cNvPr id="4" name="Picture 3"/>
-          <p:cNvPicPr>
-            <a:picLocks noChangeAspect="1"/>
-          </p:cNvPicPr>
-          <p:nvPr/>
-        </p:nvPicPr>
-        <p:blipFill>
-          <a:blip r:embed="rId2"/>
-          <a:stretch>
-            <a:fillRect/>
-          </a:stretch>
-        </p:blipFill>
-        <p:spPr>
-          <a:xfrm>
-            <a:off x="165100" y="2565400"/>
-            <a:ext cx="8813800" cy="1714500"/>
-          </a:xfrm>
-          <a:prstGeom prst="rect">
-            <a:avLst/>
-          </a:prstGeom>
-        </p:spPr>
-      </p:pic>
-    </p:spTree>
-    <p:extLst>
-      <p:ext uri="{BB962C8B-B14F-4D97-AF65-F5344CB8AC3E}">
-        <p14:creationId xmlns:p14="http://schemas.microsoft.com/office/powerpoint/2010/main" val="3522312663"/>
-      </p:ext>
-    </p:extLst>
-  </p:cSld>
-  <p:clrMapOvr>
-    <a:masterClrMapping/>
-  </p:clrMapOvr>
-  <p:timing>
-    <p:tnLst>
-      <p:par>
-        <p:cTn xmlns:p14="http://schemas.microsoft.com/office/powerpoint/2010/main" id="1" dur="indefinite" restart="never" nodeType="tmRoot"/>
-      </p:par>
-    </p:tnLst>
-  </p:timing>
-</p:sld>
-</file>
-
-<file path=ppt/slides/slide6.xml><?xml version="1.0" encoding="utf-8"?>
-<p:sld xmlns:a="http://schemas.openxmlformats.org/drawingml/2006/main" xmlns:r="http://schemas.openxmlformats.org/officeDocument/2006/relationships" xmlns:p="http://schemas.openxmlformats.org/presentationml/2006/main">
-  <p:cSld>
-    <p:spTree>
-      <p:nvGrpSpPr>
-        <p:cNvPr id="1" name=""/>
-        <p:cNvGrpSpPr/>
-        <p:nvPr/>
-      </p:nvGrpSpPr>
-      <p:grpSpPr>
-        <a:xfrm>
-          <a:off x="0" y="0"/>
-          <a:ext cx="0" cy="0"/>
-          <a:chOff x="0" y="0"/>
-          <a:chExt cx="0" cy="0"/>
-        </a:xfrm>
-      </p:grpSpPr>
-      <p:sp>
-        <p:nvSpPr>
-          <p:cNvPr id="2" name="Title 1"/>
-          <p:cNvSpPr>
-            <a:spLocks noGrp="1"/>
-          </p:cNvSpPr>
-          <p:nvPr>
-            <p:ph type="title"/>
-          </p:nvPr>
-        </p:nvSpPr>
-        <p:spPr/>
-        <p:txBody>
-          <a:bodyPr>
-            <a:normAutofit/>
-          </a:bodyPr>
-          <a:lstStyle/>
-          <a:p>
-            <a:r>
-              <a:rPr lang="en-US" dirty="0" smtClean="0"/>
-              <a:t>SPECIFICATIONS DETAILLEES</a:t>
-            </a:r>
-            <a:endParaRPr lang="en-US" dirty="0"/>
-          </a:p>
-        </p:txBody>
-      </p:sp>
-      <p:pic>
-        <p:nvPicPr>
-          <p:cNvPr id="7" name="Espace réservé du contenu 6" descr="processus.png"/>
-          <p:cNvPicPr>
-            <a:picLocks noGrp="1" noChangeAspect="1"/>
-          </p:cNvPicPr>
-          <p:nvPr>
-            <p:ph idx="1"/>
-          </p:nvPr>
-        </p:nvPicPr>
-        <p:blipFill>
-          <a:blip r:embed="rId2" cstate="email">
-            <a:extLst>
-              <a:ext uri="{28A0092B-C50C-407E-A947-70E740481C1C}">
-                <a14:useLocalDpi xmlns:a14="http://schemas.microsoft.com/office/drawing/2010/main" val="0"/>
-              </a:ext>
-            </a:extLst>
-          </a:blip>
-          <a:srcRect l="-3921" r="-3921"/>
-          <a:stretch>
-            <a:fillRect/>
-          </a:stretch>
-        </p:blipFill>
-        <p:spPr>
-          <a:xfrm>
-            <a:off x="260367" y="1918209"/>
-            <a:ext cx="8774500" cy="4762843"/>
-          </a:xfrm>
-        </p:spPr>
-      </p:pic>
-    </p:spTree>
-    <p:extLst>
-      <p:ext uri="{BB962C8B-B14F-4D97-AF65-F5344CB8AC3E}">
-        <p14:creationId xmlns:p14="http://schemas.microsoft.com/office/powerpoint/2010/main" val="3220877394"/>
-      </p:ext>
-    </p:extLst>
-  </p:cSld>
-  <p:clrMapOvr>
-    <a:masterClrMapping/>
-  </p:clrMapOvr>
-  <p:timing>
-    <p:tnLst>
-      <p:par>
-        <p:cTn xmlns:p14="http://schemas.microsoft.com/office/powerpoint/2010/main" id="1" dur="indefinite" restart="never" nodeType="tmRoot"/>
-      </p:par>
-    </p:tnLst>
-  </p:timing>
-</p:sld>
-</file>
-
-<file path=ppt/slides/slide7.xml><?xml version="1.0" encoding="utf-8"?>
-<p:sld xmlns:a="http://schemas.openxmlformats.org/drawingml/2006/main" xmlns:r="http://schemas.openxmlformats.org/officeDocument/2006/relationships" xmlns:p="http://schemas.openxmlformats.org/presentationml/2006/main">
-  <p:cSld>
-    <p:spTree>
-      <p:nvGrpSpPr>
-        <p:cNvPr id="1" name=""/>
-        <p:cNvGrpSpPr/>
-        <p:nvPr/>
-      </p:nvGrpSpPr>
-      <p:grpSpPr>
-        <a:xfrm>
-          <a:off x="0" y="0"/>
-          <a:ext cx="0" cy="0"/>
-          <a:chOff x="0" y="0"/>
-          <a:chExt cx="0" cy="0"/>
-        </a:xfrm>
-      </p:grpSpPr>
-      <p:sp>
-        <p:nvSpPr>
-          <p:cNvPr id="2" name="Titre 1"/>
-          <p:cNvSpPr>
-            <a:spLocks noGrp="1"/>
-          </p:cNvSpPr>
-          <p:nvPr>
-            <p:ph type="title"/>
-          </p:nvPr>
-        </p:nvSpPr>
-        <p:spPr/>
-        <p:txBody>
-          <a:bodyPr/>
-          <a:lstStyle/>
-          <a:p>
-            <a:r>
-              <a:rPr lang="fr-FR" dirty="0" smtClean="0"/>
-              <a:t>ABAQUES</a:t>
-            </a:r>
-            <a:endParaRPr lang="fr-FR" dirty="0"/>
-          </a:p>
-        </p:txBody>
-      </p:sp>
-      <p:pic>
-        <p:nvPicPr>
-          <p:cNvPr id="4" name="Espace réservé du contenu 3"/>
-          <p:cNvPicPr>
-            <a:picLocks noGrp="1" noChangeAspect="1"/>
-          </p:cNvPicPr>
-          <p:nvPr>
-            <p:ph idx="1"/>
-          </p:nvPr>
-        </p:nvPicPr>
-        <p:blipFill rotWithShape="1">
-          <a:blip r:embed="rId2" cstate="email">
-            <a:extLst>
-              <a:ext uri="{28A0092B-C50C-407E-A947-70E740481C1C}">
-                <a14:useLocalDpi xmlns:a14="http://schemas.microsoft.com/office/drawing/2010/main" val="0"/>
-              </a:ext>
-            </a:extLst>
-          </a:blip>
-          <a:srcRect t="-1699" r="32983" b="27490"/>
-          <a:stretch/>
-        </p:blipFill>
-        <p:spPr>
-          <a:xfrm>
-            <a:off x="498475" y="2425700"/>
-            <a:ext cx="7926454" cy="3657599"/>
-          </a:xfrm>
-        </p:spPr>
-      </p:pic>
-    </p:spTree>
-    <p:extLst>
-      <p:ext uri="{BB962C8B-B14F-4D97-AF65-F5344CB8AC3E}">
-        <p14:creationId xmlns:p14="http://schemas.microsoft.com/office/powerpoint/2010/main" val="359778942"/>
-      </p:ext>
-    </p:extLst>
-  </p:cSld>
-  <p:clrMapOvr>
-    <a:masterClrMapping/>
-  </p:clrMapOvr>
-</p:sld>
-</file>
-
-<file path=ppt/slides/slide8.xml><?xml version="1.0" encoding="utf-8"?>
-<p:sld xmlns:a="http://schemas.openxmlformats.org/drawingml/2006/main" xmlns:r="http://schemas.openxmlformats.org/officeDocument/2006/relationships" xmlns:p="http://schemas.openxmlformats.org/presentationml/2006/main">
-  <p:cSld>
-    <p:spTree>
-      <p:nvGrpSpPr>
-        <p:cNvPr id="1" name=""/>
-        <p:cNvGrpSpPr/>
-        <p:nvPr/>
-      </p:nvGrpSpPr>
-      <p:grpSpPr>
-        <a:xfrm>
-          <a:off x="0" y="0"/>
-          <a:ext cx="0" cy="0"/>
-          <a:chOff x="0" y="0"/>
-          <a:chExt cx="0" cy="0"/>
-        </a:xfrm>
-      </p:grpSpPr>
-      <p:sp>
-        <p:nvSpPr>
-          <p:cNvPr id="2" name="Title 1"/>
-          <p:cNvSpPr>
-            <a:spLocks noGrp="1"/>
-          </p:cNvSpPr>
-          <p:nvPr>
-            <p:ph type="title"/>
-          </p:nvPr>
-        </p:nvSpPr>
-        <p:spPr/>
-        <p:txBody>
-          <a:bodyPr/>
-          <a:lstStyle/>
-          <a:p>
-            <a:r>
-              <a:rPr lang="en-US" dirty="0" smtClean="0"/>
               <a:t>CHIFFRAGE</a:t>
             </a:r>
             <a:endParaRPr lang="en-US" dirty="0"/>
@@ -9466,7 +9095,7 @@
           <p:nvPr>
             <p:extLst>
               <p:ext uri="{D42A27DB-BD31-4B8C-83A1-F6EECF244321}">
-                <p14:modId xmlns:p14="http://schemas.microsoft.com/office/powerpoint/2010/main" val="2724875466"/>
+                <p14:modId xmlns:p14="http://schemas.microsoft.com/office/powerpoint/2010/main" val="3609631992"/>
               </p:ext>
             </p:extLst>
           </p:nvPr>
@@ -10706,7 +10335,7 @@
                           <a:effectLst/>
                           <a:latin typeface="Calibri"/>
                         </a:rPr>
-                        <a:t>10ù</a:t>
+                        <a:t>10%</a:t>
                       </a:r>
                       <a:endParaRPr lang="en-US" sz="1600" b="0" i="0" u="none" strike="noStrike" dirty="0">
                         <a:solidFill>
@@ -10829,6 +10458,1542 @@
     <p:extLst>
       <p:ext uri="{BB962C8B-B14F-4D97-AF65-F5344CB8AC3E}">
         <p14:creationId xmlns:p14="http://schemas.microsoft.com/office/powerpoint/2010/main" val="2481418858"/>
+      </p:ext>
+    </p:extLst>
+  </p:cSld>
+  <p:clrMapOvr>
+    <a:masterClrMapping/>
+  </p:clrMapOvr>
+  <p:timing>
+    <p:tnLst>
+      <p:par>
+        <p:cTn xmlns:p14="http://schemas.microsoft.com/office/powerpoint/2010/main" id="1" dur="indefinite" restart="never" nodeType="tmRoot"/>
+      </p:par>
+    </p:tnLst>
+  </p:timing>
+</p:sld>
+</file>
+
+<file path=ppt/slides/slide2.xml><?xml version="1.0" encoding="utf-8"?>
+<p:sld xmlns:a="http://schemas.openxmlformats.org/drawingml/2006/main" xmlns:r="http://schemas.openxmlformats.org/officeDocument/2006/relationships" xmlns:p="http://schemas.openxmlformats.org/presentationml/2006/main">
+  <p:cSld>
+    <p:spTree>
+      <p:nvGrpSpPr>
+        <p:cNvPr id="1" name=""/>
+        <p:cNvGrpSpPr/>
+        <p:nvPr/>
+      </p:nvGrpSpPr>
+      <p:grpSpPr>
+        <a:xfrm>
+          <a:off x="0" y="0"/>
+          <a:ext cx="0" cy="0"/>
+          <a:chOff x="0" y="0"/>
+          <a:chExt cx="0" cy="0"/>
+        </a:xfrm>
+      </p:grpSpPr>
+      <p:sp>
+        <p:nvSpPr>
+          <p:cNvPr id="2" name="Title 1"/>
+          <p:cNvSpPr>
+            <a:spLocks noGrp="1"/>
+          </p:cNvSpPr>
+          <p:nvPr>
+            <p:ph type="title"/>
+          </p:nvPr>
+        </p:nvSpPr>
+        <p:spPr/>
+        <p:txBody>
+          <a:bodyPr/>
+          <a:lstStyle/>
+          <a:p>
+            <a:r>
+              <a:rPr lang="en-US" dirty="0" smtClean="0"/>
+              <a:t>SOMMAIRE</a:t>
+            </a:r>
+            <a:endParaRPr lang="en-US" dirty="0"/>
+          </a:p>
+        </p:txBody>
+      </p:sp>
+      <p:sp>
+        <p:nvSpPr>
+          <p:cNvPr id="3" name="Content Placeholder 2"/>
+          <p:cNvSpPr>
+            <a:spLocks noGrp="1"/>
+          </p:cNvSpPr>
+          <p:nvPr>
+            <p:ph idx="1"/>
+          </p:nvPr>
+        </p:nvSpPr>
+        <p:spPr/>
+        <p:txBody>
+          <a:bodyPr/>
+          <a:lstStyle/>
+          <a:p>
+            <a:pPr>
+              <a:buFont typeface="Wingdings" charset="2"/>
+              <a:buChar char="Ø"/>
+            </a:pPr>
+            <a:r>
+              <a:rPr lang="en-US" dirty="0" err="1" smtClean="0"/>
+              <a:t>Contexte</a:t>
+            </a:r>
+            <a:endParaRPr lang="en-US" dirty="0" smtClean="0"/>
+          </a:p>
+          <a:p>
+            <a:pPr>
+              <a:buFont typeface="Wingdings" charset="2"/>
+              <a:buChar char="Ø"/>
+            </a:pPr>
+            <a:r>
+              <a:rPr lang="en-US" dirty="0" smtClean="0"/>
+              <a:t>Note </a:t>
+            </a:r>
+            <a:r>
+              <a:rPr lang="en-US" dirty="0" smtClean="0"/>
+              <a:t>de </a:t>
+            </a:r>
+            <a:r>
+              <a:rPr lang="en-US" dirty="0" err="1" smtClean="0"/>
+              <a:t>cadrage</a:t>
+            </a:r>
+            <a:endParaRPr lang="en-US" dirty="0" smtClean="0"/>
+          </a:p>
+          <a:p>
+            <a:pPr>
+              <a:buFont typeface="Wingdings" charset="2"/>
+              <a:buChar char="Ø"/>
+            </a:pPr>
+            <a:r>
+              <a:rPr lang="en-US" dirty="0" err="1" smtClean="0"/>
+              <a:t>Spécifications</a:t>
+            </a:r>
+            <a:r>
+              <a:rPr lang="en-US" dirty="0" smtClean="0"/>
+              <a:t> </a:t>
+            </a:r>
+            <a:r>
+              <a:rPr lang="en-US" dirty="0" err="1" smtClean="0"/>
+              <a:t>générales</a:t>
+            </a:r>
+            <a:endParaRPr lang="en-US" dirty="0" smtClean="0"/>
+          </a:p>
+          <a:p>
+            <a:pPr lvl="1">
+              <a:buFont typeface="Wingdings" charset="2"/>
+              <a:buChar char="ü"/>
+            </a:pPr>
+            <a:r>
+              <a:rPr lang="en-US" dirty="0" err="1" smtClean="0"/>
+              <a:t>Diagramme</a:t>
+            </a:r>
+            <a:r>
+              <a:rPr lang="en-US" dirty="0" smtClean="0"/>
+              <a:t> de classes</a:t>
+            </a:r>
+          </a:p>
+          <a:p>
+            <a:pPr lvl="1">
+              <a:buFont typeface="Wingdings" charset="2"/>
+              <a:buChar char="ü"/>
+            </a:pPr>
+            <a:r>
+              <a:rPr lang="en-US" dirty="0" smtClean="0"/>
+              <a:t>Uses cases: </a:t>
+            </a:r>
+          </a:p>
+          <a:p>
+            <a:pPr lvl="2">
+              <a:buFont typeface="Arial"/>
+              <a:buChar char="•"/>
+            </a:pPr>
+            <a:r>
+              <a:rPr lang="en-US" dirty="0" err="1" smtClean="0"/>
+              <a:t>Spécifications</a:t>
+            </a:r>
+            <a:r>
+              <a:rPr lang="en-US" dirty="0" smtClean="0"/>
+              <a:t> </a:t>
+            </a:r>
+            <a:r>
+              <a:rPr lang="en-US" dirty="0" err="1" smtClean="0"/>
+              <a:t>détaillées</a:t>
+            </a:r>
+            <a:endParaRPr lang="en-US" dirty="0" smtClean="0"/>
+          </a:p>
+          <a:p>
+            <a:pPr lvl="2">
+              <a:buFont typeface="Arial"/>
+              <a:buChar char="•"/>
+            </a:pPr>
+            <a:r>
+              <a:rPr lang="en-US" dirty="0" err="1" smtClean="0"/>
+              <a:t>Chiffrage</a:t>
+            </a:r>
+            <a:endParaRPr lang="en-US" dirty="0" smtClean="0"/>
+          </a:p>
+          <a:p>
+            <a:pPr lvl="2">
+              <a:buFont typeface="Arial"/>
+              <a:buChar char="•"/>
+            </a:pPr>
+            <a:r>
+              <a:rPr lang="en-US" dirty="0" smtClean="0"/>
+              <a:t>Gantt</a:t>
+            </a:r>
+          </a:p>
+        </p:txBody>
+      </p:sp>
+    </p:spTree>
+    <p:extLst>
+      <p:ext uri="{BB962C8B-B14F-4D97-AF65-F5344CB8AC3E}">
+        <p14:creationId xmlns:p14="http://schemas.microsoft.com/office/powerpoint/2010/main" val="1718126266"/>
+      </p:ext>
+    </p:extLst>
+  </p:cSld>
+  <p:clrMapOvr>
+    <a:masterClrMapping/>
+  </p:clrMapOvr>
+  <p:timing>
+    <p:tnLst>
+      <p:par>
+        <p:cTn xmlns:p14="http://schemas.microsoft.com/office/powerpoint/2010/main" id="1" dur="indefinite" restart="never" nodeType="tmRoot"/>
+      </p:par>
+    </p:tnLst>
+  </p:timing>
+</p:sld>
+</file>
+
+<file path=ppt/slides/slide3.xml><?xml version="1.0" encoding="utf-8"?>
+<p:sld xmlns:a="http://schemas.openxmlformats.org/drawingml/2006/main" xmlns:r="http://schemas.openxmlformats.org/officeDocument/2006/relationships" xmlns:p="http://schemas.openxmlformats.org/presentationml/2006/main">
+  <p:cSld>
+    <p:spTree>
+      <p:nvGrpSpPr>
+        <p:cNvPr id="1" name=""/>
+        <p:cNvGrpSpPr/>
+        <p:nvPr/>
+      </p:nvGrpSpPr>
+      <p:grpSpPr>
+        <a:xfrm>
+          <a:off x="0" y="0"/>
+          <a:ext cx="0" cy="0"/>
+          <a:chOff x="0" y="0"/>
+          <a:chExt cx="0" cy="0"/>
+        </a:xfrm>
+      </p:grpSpPr>
+      <p:sp>
+        <p:nvSpPr>
+          <p:cNvPr id="2" name="Titre 1"/>
+          <p:cNvSpPr>
+            <a:spLocks noGrp="1"/>
+          </p:cNvSpPr>
+          <p:nvPr>
+            <p:ph type="title"/>
+          </p:nvPr>
+        </p:nvSpPr>
+        <p:spPr/>
+        <p:txBody>
+          <a:bodyPr/>
+          <a:lstStyle/>
+          <a:p>
+            <a:r>
+              <a:rPr lang="fr-FR" dirty="0" smtClean="0"/>
+              <a:t>Contexte</a:t>
+            </a:r>
+            <a:endParaRPr lang="fr-FR" dirty="0"/>
+          </a:p>
+        </p:txBody>
+      </p:sp>
+      <p:sp>
+        <p:nvSpPr>
+          <p:cNvPr id="3" name="Espace réservé du contenu 2"/>
+          <p:cNvSpPr>
+            <a:spLocks noGrp="1"/>
+          </p:cNvSpPr>
+          <p:nvPr>
+            <p:ph sz="half" idx="1"/>
+          </p:nvPr>
+        </p:nvSpPr>
+        <p:spPr/>
+        <p:txBody>
+          <a:bodyPr/>
+          <a:lstStyle/>
+          <a:p>
+            <a:pPr marL="0" indent="0">
+              <a:buNone/>
+            </a:pPr>
+            <a:r>
+              <a:rPr lang="fr-FR" dirty="0" smtClean="0"/>
+              <a:t>SITE</a:t>
+            </a:r>
+          </a:p>
+          <a:p>
+            <a:r>
+              <a:rPr lang="fr-FR" dirty="0" smtClean="0"/>
+              <a:t>Contenu statique, mises à jour épisodiques</a:t>
+            </a:r>
+          </a:p>
+          <a:p>
+            <a:r>
+              <a:rPr lang="fr-FR" dirty="0" smtClean="0"/>
+              <a:t>Ton et forme formels</a:t>
+            </a:r>
+          </a:p>
+          <a:p>
+            <a:r>
+              <a:rPr lang="fr-FR" dirty="0" smtClean="0"/>
+              <a:t>Mode de communication à sens unique : interactivité n’est pas sa vocation première</a:t>
+            </a:r>
+          </a:p>
+          <a:p>
+            <a:r>
+              <a:rPr lang="fr-FR" dirty="0" smtClean="0"/>
+              <a:t>Solution classique pour les sites institutionnels d’entreprises ou les sites de ventes en ligne</a:t>
+            </a:r>
+          </a:p>
+        </p:txBody>
+      </p:sp>
+      <p:sp>
+        <p:nvSpPr>
+          <p:cNvPr id="4" name="Espace réservé du contenu 3"/>
+          <p:cNvSpPr>
+            <a:spLocks noGrp="1"/>
+          </p:cNvSpPr>
+          <p:nvPr>
+            <p:ph sz="half" idx="2"/>
+          </p:nvPr>
+        </p:nvSpPr>
+        <p:spPr/>
+        <p:txBody>
+          <a:bodyPr/>
+          <a:lstStyle/>
+          <a:p>
+            <a:pPr marL="0" indent="0">
+              <a:buNone/>
+            </a:pPr>
+            <a:r>
+              <a:rPr lang="fr-FR" dirty="0" smtClean="0"/>
+              <a:t>BLOG</a:t>
+            </a:r>
+          </a:p>
+          <a:p>
+            <a:r>
+              <a:rPr lang="fr-FR" dirty="0" smtClean="0"/>
+              <a:t>Contenu dynamique, mises à jour continuellement</a:t>
+            </a:r>
+          </a:p>
+          <a:p>
+            <a:r>
+              <a:rPr lang="fr-FR" dirty="0" smtClean="0"/>
+              <a:t>Ton et </a:t>
+            </a:r>
+            <a:r>
+              <a:rPr lang="fr-FR" dirty="0"/>
+              <a:t>f</a:t>
+            </a:r>
+            <a:r>
+              <a:rPr lang="fr-FR" dirty="0" smtClean="0"/>
+              <a:t>orme personnels</a:t>
+            </a:r>
+          </a:p>
+          <a:p>
+            <a:r>
+              <a:rPr lang="fr-FR" dirty="0" smtClean="0"/>
+              <a:t>Interactif: via commentaires, avis</a:t>
+            </a:r>
+          </a:p>
+          <a:p>
+            <a:r>
+              <a:rPr lang="fr-FR" dirty="0" smtClean="0"/>
+              <a:t>Pour animer une communauté et développer sa notoriété</a:t>
+            </a:r>
+          </a:p>
+        </p:txBody>
+      </p:sp>
+    </p:spTree>
+    <p:extLst>
+      <p:ext uri="{BB962C8B-B14F-4D97-AF65-F5344CB8AC3E}">
+        <p14:creationId xmlns:p14="http://schemas.microsoft.com/office/powerpoint/2010/main" val="3620856894"/>
+      </p:ext>
+    </p:extLst>
+  </p:cSld>
+  <p:clrMapOvr>
+    <a:masterClrMapping/>
+  </p:clrMapOvr>
+</p:sld>
+</file>
+
+<file path=ppt/slides/slide4.xml><?xml version="1.0" encoding="utf-8"?>
+<p:sld xmlns:a="http://schemas.openxmlformats.org/drawingml/2006/main" xmlns:r="http://schemas.openxmlformats.org/officeDocument/2006/relationships" xmlns:p="http://schemas.openxmlformats.org/presentationml/2006/main">
+  <p:cSld>
+    <p:spTree>
+      <p:nvGrpSpPr>
+        <p:cNvPr id="1" name=""/>
+        <p:cNvGrpSpPr/>
+        <p:nvPr/>
+      </p:nvGrpSpPr>
+      <p:grpSpPr>
+        <a:xfrm>
+          <a:off x="0" y="0"/>
+          <a:ext cx="0" cy="0"/>
+          <a:chOff x="0" y="0"/>
+          <a:chExt cx="0" cy="0"/>
+        </a:xfrm>
+      </p:grpSpPr>
+      <p:pic>
+        <p:nvPicPr>
+          <p:cNvPr id="4" name="Espace réservé du contenu 3" descr="Capture d’écran 2016-04-29 à 10.36.24.png"/>
+          <p:cNvPicPr>
+            <a:picLocks noGrp="1" noChangeAspect="1"/>
+          </p:cNvPicPr>
+          <p:nvPr>
+            <p:ph idx="1"/>
+          </p:nvPr>
+        </p:nvPicPr>
+        <p:blipFill>
+          <a:blip r:embed="rId2">
+            <a:extLst>
+              <a:ext uri="{28A0092B-C50C-407E-A947-70E740481C1C}">
+                <a14:useLocalDpi xmlns:a14="http://schemas.microsoft.com/office/drawing/2010/main" val="0"/>
+              </a:ext>
+            </a:extLst>
+          </a:blip>
+          <a:srcRect l="-77593" r="-77593"/>
+          <a:stretch>
+            <a:fillRect/>
+          </a:stretch>
+        </p:blipFill>
+        <p:spPr>
+          <a:xfrm>
+            <a:off x="784367" y="163891"/>
+            <a:ext cx="9144000" cy="4030341"/>
+          </a:xfrm>
+        </p:spPr>
+      </p:pic>
+      <p:pic>
+        <p:nvPicPr>
+          <p:cNvPr id="6" name="Image 5" descr="Capture d’écran 2016-04-29 à 10.36.49.png"/>
+          <p:cNvPicPr>
+            <a:picLocks noChangeAspect="1"/>
+          </p:cNvPicPr>
+          <p:nvPr/>
+        </p:nvPicPr>
+        <p:blipFill>
+          <a:blip r:embed="rId3">
+            <a:extLst>
+              <a:ext uri="{28A0092B-C50C-407E-A947-70E740481C1C}">
+                <a14:useLocalDpi xmlns:a14="http://schemas.microsoft.com/office/drawing/2010/main" val="0"/>
+              </a:ext>
+            </a:extLst>
+          </a:blip>
+          <a:stretch>
+            <a:fillRect/>
+          </a:stretch>
+        </p:blipFill>
+        <p:spPr>
+          <a:xfrm>
+            <a:off x="3477727" y="4135701"/>
+            <a:ext cx="3699170" cy="2658993"/>
+          </a:xfrm>
+          <a:prstGeom prst="rect">
+            <a:avLst/>
+          </a:prstGeom>
+        </p:spPr>
+      </p:pic>
+      <p:sp>
+        <p:nvSpPr>
+          <p:cNvPr id="7" name="ZoneTexte 6"/>
+          <p:cNvSpPr txBox="1"/>
+          <p:nvPr/>
+        </p:nvSpPr>
+        <p:spPr>
+          <a:xfrm>
+            <a:off x="436531" y="3003166"/>
+            <a:ext cx="2857294" cy="923330"/>
+          </a:xfrm>
+          <a:prstGeom prst="rect">
+            <a:avLst/>
+          </a:prstGeom>
+          <a:noFill/>
+        </p:spPr>
+        <p:txBody>
+          <a:bodyPr wrap="square" rtlCol="0">
+            <a:spAutoFit/>
+          </a:bodyPr>
+          <a:lstStyle/>
+          <a:p>
+            <a:r>
+              <a:rPr lang="fr-FR" dirty="0" err="1" smtClean="0"/>
+              <a:t>Zalando</a:t>
+            </a:r>
+            <a:r>
+              <a:rPr lang="fr-FR" dirty="0" smtClean="0"/>
+              <a:t> est donc un site </a:t>
+            </a:r>
+          </a:p>
+          <a:p>
+            <a:r>
+              <a:rPr lang="fr-FR" dirty="0"/>
+              <a:t>w</a:t>
+            </a:r>
+            <a:r>
+              <a:rPr lang="fr-FR" dirty="0" smtClean="0"/>
+              <a:t>eb qui fonctionne à la </a:t>
+            </a:r>
+          </a:p>
+          <a:p>
+            <a:r>
+              <a:rPr lang="fr-FR" dirty="0"/>
+              <a:t>m</a:t>
+            </a:r>
+            <a:r>
+              <a:rPr lang="fr-FR" dirty="0" smtClean="0"/>
+              <a:t>anière d’un blog</a:t>
+            </a:r>
+            <a:endParaRPr lang="fr-FR" dirty="0"/>
+          </a:p>
+        </p:txBody>
+      </p:sp>
+    </p:spTree>
+    <p:extLst>
+      <p:ext uri="{BB962C8B-B14F-4D97-AF65-F5344CB8AC3E}">
+        <p14:creationId xmlns:p14="http://schemas.microsoft.com/office/powerpoint/2010/main" val="2004545650"/>
+      </p:ext>
+    </p:extLst>
+  </p:cSld>
+  <p:clrMapOvr>
+    <a:masterClrMapping/>
+  </p:clrMapOvr>
+  <p:timing>
+    <p:tnLst>
+      <p:par>
+        <p:cTn xmlns:p14="http://schemas.microsoft.com/office/powerpoint/2010/main" id="1" dur="indefinite" restart="never" nodeType="tmRoot"/>
+      </p:par>
+    </p:tnLst>
+  </p:timing>
+</p:sld>
+</file>
+
+<file path=ppt/slides/slide5.xml><?xml version="1.0" encoding="utf-8"?>
+<p:sld xmlns:a="http://schemas.openxmlformats.org/drawingml/2006/main" xmlns:r="http://schemas.openxmlformats.org/officeDocument/2006/relationships" xmlns:p="http://schemas.openxmlformats.org/presentationml/2006/main">
+  <p:cSld>
+    <p:spTree>
+      <p:nvGrpSpPr>
+        <p:cNvPr id="1" name=""/>
+        <p:cNvGrpSpPr/>
+        <p:nvPr/>
+      </p:nvGrpSpPr>
+      <p:grpSpPr>
+        <a:xfrm>
+          <a:off x="0" y="0"/>
+          <a:ext cx="0" cy="0"/>
+          <a:chOff x="0" y="0"/>
+          <a:chExt cx="0" cy="0"/>
+        </a:xfrm>
+      </p:grpSpPr>
+      <p:sp>
+        <p:nvSpPr>
+          <p:cNvPr id="2" name="Title 1"/>
+          <p:cNvSpPr>
+            <a:spLocks noGrp="1"/>
+          </p:cNvSpPr>
+          <p:nvPr>
+            <p:ph type="title"/>
+          </p:nvPr>
+        </p:nvSpPr>
+        <p:spPr/>
+        <p:txBody>
+          <a:bodyPr/>
+          <a:lstStyle/>
+          <a:p>
+            <a:r>
+              <a:rPr lang="en-US" dirty="0" smtClean="0"/>
+              <a:t>NOTE DE </a:t>
+            </a:r>
+            <a:r>
+              <a:rPr lang="en-US" dirty="0" smtClean="0"/>
+              <a:t>CADRAGE</a:t>
+            </a:r>
+            <a:endParaRPr lang="en-US" dirty="0"/>
+          </a:p>
+        </p:txBody>
+      </p:sp>
+      <p:sp>
+        <p:nvSpPr>
+          <p:cNvPr id="3" name="Content Placeholder 2"/>
+          <p:cNvSpPr>
+            <a:spLocks noGrp="1"/>
+          </p:cNvSpPr>
+          <p:nvPr>
+            <p:ph idx="1"/>
+          </p:nvPr>
+        </p:nvSpPr>
+        <p:spPr>
+          <a:xfrm>
+            <a:off x="204377" y="1905092"/>
+            <a:ext cx="8817362" cy="4551053"/>
+          </a:xfrm>
+        </p:spPr>
+        <p:txBody>
+          <a:bodyPr>
+            <a:normAutofit fontScale="92500" lnSpcReduction="20000"/>
+          </a:bodyPr>
+          <a:lstStyle/>
+          <a:p>
+            <a:pPr>
+              <a:buFont typeface="Wingdings" charset="2"/>
+              <a:buChar char="Ø"/>
+            </a:pPr>
+            <a:r>
+              <a:rPr lang="en-US" dirty="0" smtClean="0"/>
+              <a:t>ENJEUX </a:t>
+            </a:r>
+            <a:r>
+              <a:rPr lang="en-US" sz="1600" dirty="0" err="1" smtClean="0"/>
+              <a:t>Visualisation</a:t>
+            </a:r>
+            <a:r>
+              <a:rPr lang="en-US" sz="1600" dirty="0" smtClean="0"/>
+              <a:t> </a:t>
+            </a:r>
+            <a:r>
+              <a:rPr lang="en-US" sz="1600" dirty="0" err="1" smtClean="0"/>
+              <a:t>rapide</a:t>
+            </a:r>
+            <a:r>
+              <a:rPr lang="en-US" sz="1600" dirty="0" smtClean="0"/>
+              <a:t> du </a:t>
+            </a:r>
+            <a:r>
+              <a:rPr lang="en-US" sz="1600" dirty="0" err="1" smtClean="0"/>
+              <a:t>contenu</a:t>
+            </a:r>
+            <a:r>
+              <a:rPr lang="en-US" sz="1600" dirty="0" smtClean="0"/>
+              <a:t> des </a:t>
+            </a:r>
+            <a:r>
+              <a:rPr lang="en-US" sz="1600" dirty="0" err="1" smtClean="0"/>
+              <a:t>avis</a:t>
+            </a:r>
+            <a:r>
+              <a:rPr lang="en-US" sz="1600" dirty="0" smtClean="0"/>
+              <a:t> </a:t>
+            </a:r>
+            <a:r>
+              <a:rPr lang="en-US" sz="1600" dirty="0" err="1" smtClean="0"/>
+              <a:t>concernant</a:t>
+            </a:r>
+            <a:r>
+              <a:rPr lang="en-US" sz="1600" dirty="0" smtClean="0"/>
+              <a:t> un </a:t>
+            </a:r>
+            <a:r>
+              <a:rPr lang="en-US" sz="1600" dirty="0" err="1" smtClean="0"/>
+              <a:t>produit</a:t>
+            </a:r>
+            <a:r>
+              <a:rPr lang="en-US" sz="1600" dirty="0" smtClean="0"/>
+              <a:t> en </a:t>
+            </a:r>
+            <a:r>
+              <a:rPr lang="en-US" sz="1600" dirty="0" err="1" smtClean="0"/>
+              <a:t>vente</a:t>
+            </a:r>
+            <a:endParaRPr lang="en-US" sz="1600" dirty="0" smtClean="0"/>
+          </a:p>
+          <a:p>
+            <a:pPr>
+              <a:buFont typeface="Wingdings" charset="2"/>
+              <a:buChar char="Ø"/>
+            </a:pPr>
+            <a:r>
+              <a:rPr lang="en-US" dirty="0" smtClean="0"/>
+              <a:t>OBJECTIF </a:t>
+            </a:r>
+            <a:r>
+              <a:rPr lang="en-US" sz="1600" dirty="0" err="1" smtClean="0"/>
+              <a:t>Analyse</a:t>
+            </a:r>
+            <a:r>
+              <a:rPr lang="en-US" sz="1600" dirty="0" smtClean="0"/>
+              <a:t> du </a:t>
+            </a:r>
+            <a:r>
+              <a:rPr lang="en-US" sz="1600" dirty="0" err="1" smtClean="0"/>
+              <a:t>contenu</a:t>
+            </a:r>
+            <a:r>
+              <a:rPr lang="en-US" sz="1600" dirty="0" smtClean="0"/>
+              <a:t> des </a:t>
+            </a:r>
+            <a:r>
+              <a:rPr lang="en-US" sz="1600" dirty="0" err="1" smtClean="0"/>
+              <a:t>commentaires</a:t>
+            </a:r>
+            <a:r>
+              <a:rPr lang="en-US" sz="1600" dirty="0" smtClean="0"/>
+              <a:t> </a:t>
+            </a:r>
+            <a:r>
+              <a:rPr lang="en-US" sz="1600" dirty="0" smtClean="0"/>
+              <a:t>du </a:t>
+            </a:r>
+            <a:r>
+              <a:rPr lang="en-US" sz="1600" dirty="0" smtClean="0"/>
+              <a:t>site </a:t>
+            </a:r>
+            <a:r>
+              <a:rPr lang="en-US" sz="1600" dirty="0" err="1" smtClean="0"/>
+              <a:t>marchand</a:t>
+            </a:r>
+            <a:r>
+              <a:rPr lang="en-US" sz="1600" dirty="0" smtClean="0"/>
+              <a:t> de prêt-à-</a:t>
+            </a:r>
+            <a:r>
+              <a:rPr lang="en-US" sz="1600" dirty="0" smtClean="0"/>
+              <a:t>porter et de </a:t>
+            </a:r>
+            <a:r>
+              <a:rPr lang="en-US" sz="1600" dirty="0" err="1" smtClean="0"/>
+              <a:t>chaussures</a:t>
+            </a:r>
+            <a:r>
+              <a:rPr lang="en-US" sz="1600" dirty="0" smtClean="0"/>
+              <a:t>: </a:t>
+            </a:r>
+            <a:r>
+              <a:rPr lang="en-US" sz="1600" dirty="0" err="1"/>
+              <a:t>z</a:t>
+            </a:r>
+            <a:r>
+              <a:rPr lang="en-US" sz="1600" dirty="0" err="1" smtClean="0"/>
+              <a:t>alando.fr</a:t>
+            </a:r>
+            <a:endParaRPr lang="en-US" sz="1600" dirty="0" smtClean="0"/>
+          </a:p>
+          <a:p>
+            <a:pPr>
+              <a:buFont typeface="Wingdings" charset="2"/>
+              <a:buChar char="Ø"/>
+            </a:pPr>
+            <a:r>
+              <a:rPr lang="en-US" dirty="0" smtClean="0"/>
+              <a:t>PUBLIC </a:t>
+            </a:r>
+            <a:r>
+              <a:rPr lang="en-US" sz="1600" dirty="0" err="1"/>
+              <a:t>T</a:t>
+            </a:r>
+            <a:r>
+              <a:rPr lang="en-US" sz="1600" dirty="0" err="1" smtClean="0"/>
+              <a:t>outes</a:t>
+            </a:r>
+            <a:r>
+              <a:rPr lang="en-US" sz="1600" dirty="0" smtClean="0"/>
+              <a:t> les marques qui </a:t>
+            </a:r>
+            <a:r>
+              <a:rPr lang="en-US" sz="1600" dirty="0" err="1" smtClean="0"/>
+              <a:t>ont</a:t>
+            </a:r>
+            <a:r>
+              <a:rPr lang="en-US" sz="1600" dirty="0" smtClean="0"/>
+              <a:t> au </a:t>
+            </a:r>
+            <a:r>
+              <a:rPr lang="en-US" sz="1600" dirty="0" err="1" smtClean="0"/>
+              <a:t>moins</a:t>
+            </a:r>
+            <a:r>
+              <a:rPr lang="en-US" sz="1600" dirty="0" smtClean="0"/>
+              <a:t> un </a:t>
+            </a:r>
+            <a:r>
+              <a:rPr lang="en-US" sz="1600" dirty="0" err="1" smtClean="0"/>
+              <a:t>produit</a:t>
+            </a:r>
+            <a:r>
+              <a:rPr lang="en-US" sz="1600" dirty="0" smtClean="0"/>
+              <a:t> en </a:t>
+            </a:r>
+            <a:r>
+              <a:rPr lang="en-US" sz="1600" dirty="0" err="1" smtClean="0"/>
+              <a:t>vente</a:t>
+            </a:r>
+            <a:r>
+              <a:rPr lang="en-US" sz="1600" dirty="0" smtClean="0"/>
+              <a:t> </a:t>
+            </a:r>
+            <a:r>
+              <a:rPr lang="en-US" sz="1600" dirty="0" err="1" smtClean="0"/>
+              <a:t>sur</a:t>
+            </a:r>
+            <a:r>
+              <a:rPr lang="en-US" sz="1600" dirty="0" smtClean="0"/>
+              <a:t> le site </a:t>
+            </a:r>
+            <a:r>
+              <a:rPr lang="en-US" sz="1600" dirty="0" err="1" smtClean="0"/>
+              <a:t>zalando.fr</a:t>
+            </a:r>
+            <a:endParaRPr lang="en-US" sz="1600" dirty="0" smtClean="0"/>
+          </a:p>
+          <a:p>
+            <a:pPr>
+              <a:buFont typeface="Wingdings" charset="2"/>
+              <a:buChar char="Ø"/>
+            </a:pPr>
+            <a:r>
+              <a:rPr lang="en-US" dirty="0"/>
+              <a:t>PRIORITÉS </a:t>
+            </a:r>
+          </a:p>
+          <a:p>
+            <a:pPr lvl="1">
+              <a:buFont typeface="Arial"/>
+              <a:buChar char="•"/>
+            </a:pPr>
+            <a:r>
+              <a:rPr lang="en-US" sz="1600" dirty="0" err="1"/>
+              <a:t>Priorité</a:t>
+            </a:r>
+            <a:r>
+              <a:rPr lang="en-US" sz="1600" dirty="0"/>
+              <a:t> 1 : </a:t>
+            </a:r>
+            <a:r>
+              <a:rPr lang="en-US" sz="1600" dirty="0" err="1"/>
+              <a:t>Représentation</a:t>
+            </a:r>
+            <a:r>
+              <a:rPr lang="en-US" sz="1600" dirty="0"/>
+              <a:t> </a:t>
+            </a:r>
+            <a:r>
+              <a:rPr lang="en-US" sz="1600" dirty="0" err="1"/>
+              <a:t>visuelle</a:t>
+            </a:r>
+            <a:r>
+              <a:rPr lang="en-US" sz="1600" dirty="0"/>
+              <a:t> de </a:t>
+            </a:r>
+            <a:r>
+              <a:rPr lang="en-US" sz="1600" dirty="0" err="1"/>
+              <a:t>l’analyse</a:t>
+            </a:r>
+            <a:r>
+              <a:rPr lang="en-US" sz="1600" dirty="0"/>
+              <a:t> </a:t>
+            </a:r>
+            <a:r>
+              <a:rPr lang="en-US" sz="1600" dirty="0" err="1"/>
+              <a:t>statistique</a:t>
+            </a:r>
+            <a:endParaRPr lang="en-US" sz="1600" dirty="0"/>
+          </a:p>
+          <a:p>
+            <a:pPr lvl="1">
+              <a:buFont typeface="Arial"/>
+              <a:buChar char="•"/>
+            </a:pPr>
+            <a:r>
+              <a:rPr lang="en-US" sz="1600" dirty="0" err="1"/>
+              <a:t>Priorité</a:t>
+            </a:r>
+            <a:r>
+              <a:rPr lang="en-US" sz="1600" dirty="0"/>
+              <a:t> 2 : </a:t>
+            </a:r>
+            <a:r>
+              <a:rPr lang="en-US" sz="1600" dirty="0" err="1"/>
+              <a:t>Analyse</a:t>
+            </a:r>
+            <a:r>
+              <a:rPr lang="en-US" sz="1600" dirty="0"/>
+              <a:t> </a:t>
+            </a:r>
+            <a:r>
+              <a:rPr lang="en-US" sz="1600" dirty="0" err="1"/>
+              <a:t>sémantique</a:t>
+            </a:r>
+            <a:endParaRPr lang="en-US" sz="1600" dirty="0"/>
+          </a:p>
+          <a:p>
+            <a:pPr lvl="1">
+              <a:buFont typeface="Arial"/>
+              <a:buChar char="•"/>
+            </a:pPr>
+            <a:r>
+              <a:rPr lang="en-US" sz="1600" dirty="0" err="1"/>
+              <a:t>Priorité</a:t>
+            </a:r>
+            <a:r>
+              <a:rPr lang="en-US" sz="1600" dirty="0"/>
+              <a:t> 3 : </a:t>
+            </a:r>
+            <a:r>
+              <a:rPr lang="en-US" sz="1600" dirty="0" err="1"/>
+              <a:t>Gestion</a:t>
+            </a:r>
+            <a:r>
+              <a:rPr lang="en-US" sz="1600" dirty="0"/>
+              <a:t> </a:t>
+            </a:r>
+            <a:r>
+              <a:rPr lang="en-US" sz="1600" dirty="0" err="1"/>
+              <a:t>d’une</a:t>
+            </a:r>
+            <a:r>
+              <a:rPr lang="en-US" sz="1600" dirty="0"/>
+              <a:t> </a:t>
+            </a:r>
+            <a:r>
+              <a:rPr lang="en-US" sz="1600" dirty="0" err="1"/>
+              <a:t>mauvaise</a:t>
+            </a:r>
+            <a:r>
+              <a:rPr lang="en-US" sz="1600" dirty="0"/>
+              <a:t> entrée (</a:t>
+            </a:r>
+            <a:r>
+              <a:rPr lang="en-US" sz="1600" dirty="0" err="1"/>
+              <a:t>autre</a:t>
+            </a:r>
+            <a:r>
+              <a:rPr lang="en-US" sz="1600" dirty="0"/>
+              <a:t> </a:t>
+            </a:r>
+            <a:r>
+              <a:rPr lang="en-US" sz="1600" dirty="0" err="1"/>
+              <a:t>que</a:t>
+            </a:r>
+            <a:r>
+              <a:rPr lang="en-US" sz="1600" dirty="0"/>
+              <a:t> </a:t>
+            </a:r>
+            <a:r>
+              <a:rPr lang="en-US" sz="1600" dirty="0" err="1"/>
+              <a:t>Zalando</a:t>
+            </a:r>
+            <a:r>
+              <a:rPr lang="en-US" sz="1600" dirty="0"/>
+              <a:t>)</a:t>
+            </a:r>
+          </a:p>
+          <a:p>
+            <a:pPr>
+              <a:buFont typeface="Wingdings" charset="2"/>
+              <a:buChar char="Ø"/>
+            </a:pPr>
+            <a:r>
+              <a:rPr lang="en-US" dirty="0"/>
+              <a:t>DEFINITION DE L’ORGANISATION </a:t>
+            </a:r>
+            <a:r>
+              <a:rPr lang="en-US" sz="1600" dirty="0" err="1"/>
+              <a:t>Répartition</a:t>
+            </a:r>
+            <a:r>
+              <a:rPr lang="en-US" sz="1600" dirty="0"/>
+              <a:t> des </a:t>
+            </a:r>
+            <a:r>
+              <a:rPr lang="en-US" sz="1600" dirty="0" err="1"/>
+              <a:t>tâches</a:t>
+            </a:r>
+            <a:r>
+              <a:rPr lang="en-US" sz="1600" dirty="0"/>
+              <a:t> </a:t>
+            </a:r>
+            <a:r>
+              <a:rPr lang="en-US" sz="1600" dirty="0" err="1"/>
+              <a:t>dans</a:t>
+            </a:r>
+            <a:r>
+              <a:rPr lang="en-US" sz="1600" dirty="0"/>
+              <a:t> </a:t>
+            </a:r>
+            <a:r>
+              <a:rPr lang="en-US" sz="1600" dirty="0" err="1"/>
+              <a:t>chaque</a:t>
+            </a:r>
+            <a:r>
+              <a:rPr lang="en-US" sz="1600" dirty="0"/>
+              <a:t> phase </a:t>
+            </a:r>
+          </a:p>
+          <a:p>
+            <a:pPr>
+              <a:buFont typeface="Wingdings" charset="2"/>
+              <a:buChar char="Ø"/>
+            </a:pPr>
+            <a:r>
+              <a:rPr lang="en-US" dirty="0"/>
+              <a:t>PRINCIPAUX RISQUES</a:t>
+            </a:r>
+          </a:p>
+          <a:p>
+            <a:pPr lvl="1">
+              <a:buFont typeface="Arial"/>
+              <a:buChar char="•"/>
+            </a:pPr>
+            <a:r>
+              <a:rPr lang="en-US" sz="1600" dirty="0" err="1" smtClean="0"/>
+              <a:t>Recherche</a:t>
+            </a:r>
+            <a:r>
+              <a:rPr lang="en-US" sz="1600" dirty="0" smtClean="0"/>
+              <a:t> en </a:t>
+            </a:r>
+            <a:r>
+              <a:rPr lang="en-US" sz="1600" dirty="0" err="1" smtClean="0"/>
+              <a:t>amont</a:t>
+            </a:r>
+            <a:r>
+              <a:rPr lang="en-US" sz="1600" dirty="0" smtClean="0"/>
+              <a:t> des </a:t>
+            </a:r>
+            <a:r>
+              <a:rPr lang="en-US" sz="1600" dirty="0" err="1" smtClean="0"/>
+              <a:t>ressources</a:t>
+            </a:r>
+            <a:endParaRPr lang="en-US" sz="1600" dirty="0" smtClean="0"/>
+          </a:p>
+          <a:p>
+            <a:pPr lvl="1">
+              <a:buFont typeface="Arial"/>
+              <a:buChar char="•"/>
+            </a:pPr>
+            <a:r>
+              <a:rPr lang="en-US" sz="1600" dirty="0" err="1" smtClean="0"/>
+              <a:t>Langage</a:t>
+            </a:r>
+            <a:r>
+              <a:rPr lang="en-US" sz="1600" dirty="0" smtClean="0"/>
+              <a:t> </a:t>
+            </a:r>
+            <a:r>
+              <a:rPr lang="en-US" sz="1600" dirty="0"/>
+              <a:t>naturel : </a:t>
+            </a:r>
+            <a:r>
+              <a:rPr lang="en-US" sz="1600" dirty="0" err="1"/>
+              <a:t>ironie</a:t>
+            </a:r>
+            <a:r>
+              <a:rPr lang="en-US" sz="1600" dirty="0"/>
+              <a:t>, </a:t>
+            </a:r>
+            <a:r>
+              <a:rPr lang="en-US" sz="1600" dirty="0" err="1"/>
+              <a:t>fautes</a:t>
+            </a:r>
+            <a:r>
+              <a:rPr lang="en-US" sz="1600" dirty="0"/>
+              <a:t> </a:t>
+            </a:r>
+            <a:r>
+              <a:rPr lang="en-US" sz="1600" dirty="0" err="1"/>
+              <a:t>d’orthographe</a:t>
+            </a:r>
+            <a:r>
+              <a:rPr lang="en-US" sz="1600" dirty="0"/>
+              <a:t>, </a:t>
+            </a:r>
+            <a:r>
+              <a:rPr lang="en-US" sz="1600" dirty="0" err="1"/>
+              <a:t>langage</a:t>
+            </a:r>
+            <a:r>
+              <a:rPr lang="en-US" sz="1600" dirty="0"/>
+              <a:t> </a:t>
+            </a:r>
+            <a:r>
+              <a:rPr lang="en-US" sz="1600" dirty="0" err="1" smtClean="0"/>
+              <a:t>sms</a:t>
+            </a:r>
+            <a:r>
+              <a:rPr lang="en-US" sz="1600" dirty="0" smtClean="0"/>
+              <a:t> + </a:t>
+            </a:r>
+            <a:r>
+              <a:rPr lang="en-US" sz="1600" dirty="0" err="1" smtClean="0"/>
+              <a:t>contexte</a:t>
+            </a:r>
+            <a:endParaRPr lang="en-US" sz="1600" dirty="0"/>
+          </a:p>
+          <a:p>
+            <a:pPr lvl="1">
+              <a:buFont typeface="Arial"/>
+              <a:buChar char="•"/>
+            </a:pPr>
+            <a:r>
+              <a:rPr lang="en-US" sz="1600" dirty="0" err="1"/>
+              <a:t>Gestion</a:t>
+            </a:r>
+            <a:r>
+              <a:rPr lang="en-US" sz="1600" dirty="0"/>
+              <a:t> du </a:t>
+            </a:r>
+            <a:r>
+              <a:rPr lang="en-US" sz="1600" dirty="0" smtClean="0"/>
+              <a:t>temps</a:t>
+            </a:r>
+            <a:endParaRPr lang="en-US" sz="1600" dirty="0" smtClean="0"/>
+          </a:p>
+          <a:p>
+            <a:pPr marL="0" indent="0">
+              <a:buNone/>
+            </a:pPr>
+            <a:endParaRPr lang="en-US" sz="1600" dirty="0"/>
+          </a:p>
+        </p:txBody>
+      </p:sp>
+    </p:spTree>
+    <p:extLst>
+      <p:ext uri="{BB962C8B-B14F-4D97-AF65-F5344CB8AC3E}">
+        <p14:creationId xmlns:p14="http://schemas.microsoft.com/office/powerpoint/2010/main" val="1366717793"/>
+      </p:ext>
+    </p:extLst>
+  </p:cSld>
+  <p:clrMapOvr>
+    <a:masterClrMapping/>
+  </p:clrMapOvr>
+  <p:timing>
+    <p:tnLst>
+      <p:par>
+        <p:cTn xmlns:p14="http://schemas.microsoft.com/office/powerpoint/2010/main" id="1" dur="indefinite" restart="never" nodeType="tmRoot"/>
+      </p:par>
+    </p:tnLst>
+  </p:timing>
+</p:sld>
+</file>
+
+<file path=ppt/slides/slide6.xml><?xml version="1.0" encoding="utf-8"?>
+<p:sld xmlns:a="http://schemas.openxmlformats.org/drawingml/2006/main" xmlns:r="http://schemas.openxmlformats.org/officeDocument/2006/relationships" xmlns:p="http://schemas.openxmlformats.org/presentationml/2006/main">
+  <p:cSld>
+    <p:spTree>
+      <p:nvGrpSpPr>
+        <p:cNvPr id="1" name=""/>
+        <p:cNvGrpSpPr/>
+        <p:nvPr/>
+      </p:nvGrpSpPr>
+      <p:grpSpPr>
+        <a:xfrm>
+          <a:off x="0" y="0"/>
+          <a:ext cx="0" cy="0"/>
+          <a:chOff x="0" y="0"/>
+          <a:chExt cx="0" cy="0"/>
+        </a:xfrm>
+      </p:grpSpPr>
+      <p:sp>
+        <p:nvSpPr>
+          <p:cNvPr id="2" name="Title 1"/>
+          <p:cNvSpPr>
+            <a:spLocks noGrp="1"/>
+          </p:cNvSpPr>
+          <p:nvPr>
+            <p:ph type="title"/>
+          </p:nvPr>
+        </p:nvSpPr>
+        <p:spPr/>
+        <p:txBody>
+          <a:bodyPr>
+            <a:normAutofit/>
+          </a:bodyPr>
+          <a:lstStyle/>
+          <a:p>
+            <a:r>
+              <a:rPr lang="en-US" dirty="0" smtClean="0"/>
+              <a:t>DIAGRAMME DES CLASSES</a:t>
+            </a:r>
+            <a:endParaRPr lang="en-US" dirty="0"/>
+          </a:p>
+        </p:txBody>
+      </p:sp>
+      <p:pic>
+        <p:nvPicPr>
+          <p:cNvPr id="3" name="Image 2" descr="diagClasses.png"/>
+          <p:cNvPicPr>
+            <a:picLocks noChangeAspect="1"/>
+          </p:cNvPicPr>
+          <p:nvPr/>
+        </p:nvPicPr>
+        <p:blipFill>
+          <a:blip r:embed="rId3">
+            <a:extLst>
+              <a:ext uri="{28A0092B-C50C-407E-A947-70E740481C1C}">
+                <a14:useLocalDpi xmlns:a14="http://schemas.microsoft.com/office/drawing/2010/main" val="0"/>
+              </a:ext>
+            </a:extLst>
+          </a:blip>
+          <a:stretch>
+            <a:fillRect/>
+          </a:stretch>
+        </p:blipFill>
+        <p:spPr>
+          <a:xfrm>
+            <a:off x="1255210" y="1213334"/>
+            <a:ext cx="4895907" cy="5530366"/>
+          </a:xfrm>
+          <a:prstGeom prst="rect">
+            <a:avLst/>
+          </a:prstGeom>
+        </p:spPr>
+      </p:pic>
+      <p:sp>
+        <p:nvSpPr>
+          <p:cNvPr id="4" name="ZoneTexte 3"/>
+          <p:cNvSpPr txBox="1"/>
+          <p:nvPr/>
+        </p:nvSpPr>
+        <p:spPr>
+          <a:xfrm>
+            <a:off x="5912096" y="5035272"/>
+            <a:ext cx="2775895" cy="923330"/>
+          </a:xfrm>
+          <a:prstGeom prst="rect">
+            <a:avLst/>
+          </a:prstGeom>
+          <a:noFill/>
+        </p:spPr>
+        <p:txBody>
+          <a:bodyPr wrap="none" rtlCol="0">
+            <a:spAutoFit/>
+          </a:bodyPr>
+          <a:lstStyle/>
+          <a:p>
+            <a:r>
+              <a:rPr lang="fr-FR" dirty="0" smtClean="0"/>
+              <a:t>Ne sont pas présentes </a:t>
+            </a:r>
+          </a:p>
+          <a:p>
+            <a:r>
+              <a:rPr lang="fr-FR" dirty="0" smtClean="0"/>
+              <a:t>les classes des librairies </a:t>
+            </a:r>
+          </a:p>
+          <a:p>
+            <a:r>
+              <a:rPr lang="fr-FR" dirty="0" smtClean="0"/>
+              <a:t>que nous allons utiliser</a:t>
+            </a:r>
+            <a:endParaRPr lang="fr-FR" dirty="0"/>
+          </a:p>
+        </p:txBody>
+      </p:sp>
+    </p:spTree>
+    <p:extLst>
+      <p:ext uri="{BB962C8B-B14F-4D97-AF65-F5344CB8AC3E}">
+        <p14:creationId xmlns:p14="http://schemas.microsoft.com/office/powerpoint/2010/main" val="1514672248"/>
+      </p:ext>
+    </p:extLst>
+  </p:cSld>
+  <p:clrMapOvr>
+    <a:masterClrMapping/>
+  </p:clrMapOvr>
+  <p:timing>
+    <p:tnLst>
+      <p:par>
+        <p:cTn xmlns:p14="http://schemas.microsoft.com/office/powerpoint/2010/main" id="1" dur="indefinite" restart="never" nodeType="tmRoot"/>
+      </p:par>
+    </p:tnLst>
+  </p:timing>
+</p:sld>
+</file>
+
+<file path=ppt/slides/slide7.xml><?xml version="1.0" encoding="utf-8"?>
+<p:sld xmlns:a="http://schemas.openxmlformats.org/drawingml/2006/main" xmlns:r="http://schemas.openxmlformats.org/officeDocument/2006/relationships" xmlns:p="http://schemas.openxmlformats.org/presentationml/2006/main">
+  <p:cSld>
+    <p:spTree>
+      <p:nvGrpSpPr>
+        <p:cNvPr id="1" name=""/>
+        <p:cNvGrpSpPr/>
+        <p:nvPr/>
+      </p:nvGrpSpPr>
+      <p:grpSpPr>
+        <a:xfrm>
+          <a:off x="0" y="0"/>
+          <a:ext cx="0" cy="0"/>
+          <a:chOff x="0" y="0"/>
+          <a:chExt cx="0" cy="0"/>
+        </a:xfrm>
+      </p:grpSpPr>
+      <p:sp>
+        <p:nvSpPr>
+          <p:cNvPr id="2" name="Title 1"/>
+          <p:cNvSpPr>
+            <a:spLocks noGrp="1"/>
+          </p:cNvSpPr>
+          <p:nvPr>
+            <p:ph type="title"/>
+          </p:nvPr>
+        </p:nvSpPr>
+        <p:spPr/>
+        <p:txBody>
+          <a:bodyPr/>
+          <a:lstStyle/>
+          <a:p>
+            <a:r>
+              <a:rPr lang="en-US" dirty="0" smtClean="0"/>
+              <a:t>USE CASE</a:t>
+            </a:r>
+            <a:endParaRPr lang="en-US" dirty="0"/>
+          </a:p>
+        </p:txBody>
+      </p:sp>
+      <p:pic>
+        <p:nvPicPr>
+          <p:cNvPr id="4" name="Picture 3"/>
+          <p:cNvPicPr>
+            <a:picLocks noChangeAspect="1"/>
+          </p:cNvPicPr>
+          <p:nvPr/>
+        </p:nvPicPr>
+        <p:blipFill>
+          <a:blip r:embed="rId2"/>
+          <a:stretch>
+            <a:fillRect/>
+          </a:stretch>
+        </p:blipFill>
+        <p:spPr>
+          <a:xfrm>
+            <a:off x="165100" y="2565400"/>
+            <a:ext cx="8813800" cy="1714500"/>
+          </a:xfrm>
+          <a:prstGeom prst="rect">
+            <a:avLst/>
+          </a:prstGeom>
+        </p:spPr>
+      </p:pic>
+      <p:sp>
+        <p:nvSpPr>
+          <p:cNvPr id="3" name="ZoneTexte 2"/>
+          <p:cNvSpPr txBox="1"/>
+          <p:nvPr/>
+        </p:nvSpPr>
+        <p:spPr>
+          <a:xfrm>
+            <a:off x="281643" y="6349368"/>
+            <a:ext cx="8697257" cy="307777"/>
+          </a:xfrm>
+          <a:prstGeom prst="rect">
+            <a:avLst/>
+          </a:prstGeom>
+          <a:noFill/>
+        </p:spPr>
+        <p:txBody>
+          <a:bodyPr wrap="square" rtlCol="0">
+            <a:spAutoFit/>
+          </a:bodyPr>
+          <a:lstStyle/>
+          <a:p>
+            <a:r>
+              <a:rPr lang="fr-FR" sz="1400" dirty="0" smtClean="0">
+                <a:solidFill>
+                  <a:schemeClr val="bg1">
+                    <a:lumMod val="50000"/>
+                  </a:schemeClr>
+                </a:solidFill>
+              </a:rPr>
+              <a:t>Note: use case administrateur ajout/suppression dans le dictionnaire non inclus dans le projet </a:t>
+            </a:r>
+            <a:endParaRPr lang="fr-FR" sz="1400" dirty="0">
+              <a:solidFill>
+                <a:schemeClr val="bg1">
+                  <a:lumMod val="50000"/>
+                </a:schemeClr>
+              </a:solidFill>
+            </a:endParaRPr>
+          </a:p>
+        </p:txBody>
+      </p:sp>
+    </p:spTree>
+    <p:extLst>
+      <p:ext uri="{BB962C8B-B14F-4D97-AF65-F5344CB8AC3E}">
+        <p14:creationId xmlns:p14="http://schemas.microsoft.com/office/powerpoint/2010/main" val="3522312663"/>
+      </p:ext>
+    </p:extLst>
+  </p:cSld>
+  <p:clrMapOvr>
+    <a:masterClrMapping/>
+  </p:clrMapOvr>
+  <p:timing>
+    <p:tnLst>
+      <p:par>
+        <p:cTn xmlns:p14="http://schemas.microsoft.com/office/powerpoint/2010/main" id="1" dur="indefinite" restart="never" nodeType="tmRoot"/>
+      </p:par>
+    </p:tnLst>
+  </p:timing>
+</p:sld>
+</file>
+
+<file path=ppt/slides/slide8.xml><?xml version="1.0" encoding="utf-8"?>
+<p:sld xmlns:a="http://schemas.openxmlformats.org/drawingml/2006/main" xmlns:r="http://schemas.openxmlformats.org/officeDocument/2006/relationships" xmlns:p="http://schemas.openxmlformats.org/presentationml/2006/main">
+  <p:cSld>
+    <p:spTree>
+      <p:nvGrpSpPr>
+        <p:cNvPr id="1" name=""/>
+        <p:cNvGrpSpPr/>
+        <p:nvPr/>
+      </p:nvGrpSpPr>
+      <p:grpSpPr>
+        <a:xfrm>
+          <a:off x="0" y="0"/>
+          <a:ext cx="0" cy="0"/>
+          <a:chOff x="0" y="0"/>
+          <a:chExt cx="0" cy="0"/>
+        </a:xfrm>
+      </p:grpSpPr>
+      <p:sp>
+        <p:nvSpPr>
+          <p:cNvPr id="2" name="Title 1"/>
+          <p:cNvSpPr>
+            <a:spLocks noGrp="1"/>
+          </p:cNvSpPr>
+          <p:nvPr>
+            <p:ph type="title"/>
+          </p:nvPr>
+        </p:nvSpPr>
+        <p:spPr/>
+        <p:txBody>
+          <a:bodyPr>
+            <a:normAutofit/>
+          </a:bodyPr>
+          <a:lstStyle/>
+          <a:p>
+            <a:r>
+              <a:rPr lang="en-US" dirty="0" smtClean="0"/>
+              <a:t>SPECIFICATIONS DETAILLEES</a:t>
+            </a:r>
+            <a:endParaRPr lang="en-US" dirty="0"/>
+          </a:p>
+        </p:txBody>
+      </p:sp>
+      <p:pic>
+        <p:nvPicPr>
+          <p:cNvPr id="7" name="Espace réservé du contenu 6" descr="processus.png"/>
+          <p:cNvPicPr>
+            <a:picLocks noGrp="1" noChangeAspect="1"/>
+          </p:cNvPicPr>
+          <p:nvPr>
+            <p:ph idx="1"/>
+          </p:nvPr>
+        </p:nvPicPr>
+        <p:blipFill>
+          <a:blip r:embed="rId2" cstate="email">
+            <a:extLst>
+              <a:ext uri="{28A0092B-C50C-407E-A947-70E740481C1C}">
+                <a14:useLocalDpi xmlns:a14="http://schemas.microsoft.com/office/drawing/2010/main" val="0"/>
+              </a:ext>
+            </a:extLst>
+          </a:blip>
+          <a:srcRect l="-3921" r="-3921"/>
+          <a:stretch>
+            <a:fillRect/>
+          </a:stretch>
+        </p:blipFill>
+        <p:spPr>
+          <a:xfrm>
+            <a:off x="260367" y="1918209"/>
+            <a:ext cx="8774500" cy="4762843"/>
+          </a:xfrm>
+        </p:spPr>
+      </p:pic>
+    </p:spTree>
+    <p:extLst>
+      <p:ext uri="{BB962C8B-B14F-4D97-AF65-F5344CB8AC3E}">
+        <p14:creationId xmlns:p14="http://schemas.microsoft.com/office/powerpoint/2010/main" val="3220877394"/>
+      </p:ext>
+    </p:extLst>
+  </p:cSld>
+  <p:clrMapOvr>
+    <a:masterClrMapping/>
+  </p:clrMapOvr>
+  <p:timing>
+    <p:tnLst>
+      <p:par>
+        <p:cTn xmlns:p14="http://schemas.microsoft.com/office/powerpoint/2010/main" id="1" dur="indefinite" restart="never" nodeType="tmRoot"/>
+      </p:par>
+    </p:tnLst>
+  </p:timing>
+</p:sld>
+</file>
+
+<file path=ppt/slides/slide9.xml><?xml version="1.0" encoding="utf-8"?>
+<p:sld xmlns:a="http://schemas.openxmlformats.org/drawingml/2006/main" xmlns:r="http://schemas.openxmlformats.org/officeDocument/2006/relationships" xmlns:p="http://schemas.openxmlformats.org/presentationml/2006/main">
+  <p:cSld>
+    <p:spTree>
+      <p:nvGrpSpPr>
+        <p:cNvPr id="1" name=""/>
+        <p:cNvGrpSpPr/>
+        <p:nvPr/>
+      </p:nvGrpSpPr>
+      <p:grpSpPr>
+        <a:xfrm>
+          <a:off x="0" y="0"/>
+          <a:ext cx="0" cy="0"/>
+          <a:chOff x="0" y="0"/>
+          <a:chExt cx="0" cy="0"/>
+        </a:xfrm>
+      </p:grpSpPr>
+      <p:sp>
+        <p:nvSpPr>
+          <p:cNvPr id="2" name="Titre 1"/>
+          <p:cNvSpPr>
+            <a:spLocks noGrp="1"/>
+          </p:cNvSpPr>
+          <p:nvPr>
+            <p:ph type="title"/>
+          </p:nvPr>
+        </p:nvSpPr>
+        <p:spPr/>
+        <p:txBody>
+          <a:bodyPr/>
+          <a:lstStyle/>
+          <a:p>
+            <a:r>
+              <a:rPr lang="fr-FR" dirty="0" smtClean="0"/>
+              <a:t>ABAQUES</a:t>
+            </a:r>
+            <a:endParaRPr lang="fr-FR" dirty="0"/>
+          </a:p>
+        </p:txBody>
+      </p:sp>
+      <p:pic>
+        <p:nvPicPr>
+          <p:cNvPr id="4" name="Espace réservé du contenu 3"/>
+          <p:cNvPicPr>
+            <a:picLocks noGrp="1" noChangeAspect="1"/>
+          </p:cNvPicPr>
+          <p:nvPr>
+            <p:ph idx="1"/>
+          </p:nvPr>
+        </p:nvPicPr>
+        <p:blipFill rotWithShape="1">
+          <a:blip r:embed="rId2" cstate="email">
+            <a:extLst>
+              <a:ext uri="{28A0092B-C50C-407E-A947-70E740481C1C}">
+                <a14:useLocalDpi xmlns:a14="http://schemas.microsoft.com/office/drawing/2010/main" val="0"/>
+              </a:ext>
+            </a:extLst>
+          </a:blip>
+          <a:srcRect t="-1699" r="32983" b="27490"/>
+          <a:stretch/>
+        </p:blipFill>
+        <p:spPr>
+          <a:xfrm>
+            <a:off x="498475" y="2425700"/>
+            <a:ext cx="7926454" cy="3657599"/>
+          </a:xfrm>
+        </p:spPr>
+      </p:pic>
+    </p:spTree>
+    <p:extLst>
+      <p:ext uri="{BB962C8B-B14F-4D97-AF65-F5344CB8AC3E}">
+        <p14:creationId xmlns:p14="http://schemas.microsoft.com/office/powerpoint/2010/main" val="359778942"/>
       </p:ext>
     </p:extLst>
   </p:cSld>
@@ -11109,4 +12274,324 @@
   </a:objectDefaults>
   <a:extraClrSchemeLst/>
 </a:theme>
+</file>
+
+<file path=ppt/theme/theme2.xml><?xml version="1.0" encoding="utf-8"?>
+<a:theme xmlns:a="http://schemas.openxmlformats.org/drawingml/2006/main" name="Thème Office">
+  <a:themeElements>
+    <a:clrScheme name="Bureau">
+      <a:dk1>
+        <a:sysClr val="windowText" lastClr="000000"/>
+      </a:dk1>
+      <a:lt1>
+        <a:sysClr val="window" lastClr="FFFFFF"/>
+      </a:lt1>
+      <a:dk2>
+        <a:srgbClr val="1F497D"/>
+      </a:dk2>
+      <a:lt2>
+        <a:srgbClr val="EEECE1"/>
+      </a:lt2>
+      <a:accent1>
+        <a:srgbClr val="4F81BD"/>
+      </a:accent1>
+      <a:accent2>
+        <a:srgbClr val="C0504D"/>
+      </a:accent2>
+      <a:accent3>
+        <a:srgbClr val="9BBB59"/>
+      </a:accent3>
+      <a:accent4>
+        <a:srgbClr val="8064A2"/>
+      </a:accent4>
+      <a:accent5>
+        <a:srgbClr val="4BACC6"/>
+      </a:accent5>
+      <a:accent6>
+        <a:srgbClr val="F79646"/>
+      </a:accent6>
+      <a:hlink>
+        <a:srgbClr val="0000FF"/>
+      </a:hlink>
+      <a:folHlink>
+        <a:srgbClr val="800080"/>
+      </a:folHlink>
+    </a:clrScheme>
+    <a:fontScheme name="Bureau">
+      <a:majorFont>
+        <a:latin typeface="Calibri"/>
+        <a:ea typeface=""/>
+        <a:cs typeface=""/>
+        <a:font script="Jpan" typeface="ＭＳ Ｐゴシック"/>
+        <a:font script="Hang" typeface="맑은 고딕"/>
+        <a:font script="Hans" typeface="宋体"/>
+        <a:font script="Hant" typeface="新細明體"/>
+        <a:font script="Arab" typeface="Times New Roman"/>
+        <a:font script="Hebr" typeface="Times New Roman"/>
+        <a:font script="Thai" typeface="Angsana New"/>
+        <a:font script="Ethi" typeface="Nyala"/>
+        <a:font script="Beng" typeface="Vrinda"/>
+        <a:font script="Gujr" typeface="Shruti"/>
+        <a:font script="Khmr" typeface="MoolBoran"/>
+        <a:font script="Knda" typeface="Tunga"/>
+        <a:font script="Guru" typeface="Raavi"/>
+        <a:font script="Cans" typeface="Euphemia"/>
+        <a:font script="Cher" typeface="Plantagenet Cherokee"/>
+        <a:font script="Yiii" typeface="Microsoft Yi Baiti"/>
+        <a:font script="Tibt" typeface="Microsoft Himalaya"/>
+        <a:font script="Thaa" typeface="MV Boli"/>
+        <a:font script="Deva" typeface="Mangal"/>
+        <a:font script="Telu" typeface="Gautami"/>
+        <a:font script="Taml" typeface="Latha"/>
+        <a:font script="Syrc" typeface="Estrangelo Edessa"/>
+        <a:font script="Orya" typeface="Kalinga"/>
+        <a:font script="Mlym" typeface="Kartika"/>
+        <a:font script="Laoo" typeface="DokChampa"/>
+        <a:font script="Sinh" typeface="Iskoola Pota"/>
+        <a:font script="Mong" typeface="Mongolian Baiti"/>
+        <a:font script="Viet" typeface="Times New Roman"/>
+        <a:font script="Uigh" typeface="Microsoft Uighur"/>
+        <a:font script="Geor" typeface="Sylfaen"/>
+      </a:majorFont>
+      <a:minorFont>
+        <a:latin typeface="Calibri"/>
+        <a:ea typeface=""/>
+        <a:cs typeface=""/>
+        <a:font script="Jpan" typeface="ＭＳ Ｐゴシック"/>
+        <a:font script="Hang" typeface="맑은 고딕"/>
+        <a:font script="Hans" typeface="宋体"/>
+        <a:font script="Hant" typeface="新細明體"/>
+        <a:font script="Arab" typeface="Arial"/>
+        <a:font script="Hebr" typeface="Arial"/>
+        <a:font script="Thai" typeface="Cordia New"/>
+        <a:font script="Ethi" typeface="Nyala"/>
+        <a:font script="Beng" typeface="Vrinda"/>
+        <a:font script="Gujr" typeface="Shruti"/>
+        <a:font script="Khmr" typeface="DaunPenh"/>
+        <a:font script="Knda" typeface="Tunga"/>
+        <a:font script="Guru" typeface="Raavi"/>
+        <a:font script="Cans" typeface="Euphemia"/>
+        <a:font script="Cher" typeface="Plantagenet Cherokee"/>
+        <a:font script="Yiii" typeface="Microsoft Yi Baiti"/>
+        <a:font script="Tibt" typeface="Microsoft Himalaya"/>
+        <a:font script="Thaa" typeface="MV Boli"/>
+        <a:font script="Deva" typeface="Mangal"/>
+        <a:font script="Telu" typeface="Gautami"/>
+        <a:font script="Taml" typeface="Latha"/>
+        <a:font script="Syrc" typeface="Estrangelo Edessa"/>
+        <a:font script="Orya" typeface="Kalinga"/>
+        <a:font script="Mlym" typeface="Kartika"/>
+        <a:font script="Laoo" typeface="DokChampa"/>
+        <a:font script="Sinh" typeface="Iskoola Pota"/>
+        <a:font script="Mong" typeface="Mongolian Baiti"/>
+        <a:font script="Viet" typeface="Arial"/>
+        <a:font script="Uigh" typeface="Microsoft Uighur"/>
+        <a:font script="Geor" typeface="Sylfaen"/>
+      </a:minorFont>
+    </a:fontScheme>
+    <a:fmtScheme name="Bureau">
+      <a:fillStyleLst>
+        <a:solidFill>
+          <a:schemeClr val="phClr"/>
+        </a:solidFill>
+        <a:gradFill rotWithShape="1">
+          <a:gsLst>
+            <a:gs pos="0">
+              <a:schemeClr val="phClr">
+                <a:tint val="50000"/>
+                <a:satMod val="300000"/>
+              </a:schemeClr>
+            </a:gs>
+            <a:gs pos="35000">
+              <a:schemeClr val="phClr">
+                <a:tint val="37000"/>
+                <a:satMod val="300000"/>
+              </a:schemeClr>
+            </a:gs>
+            <a:gs pos="100000">
+              <a:schemeClr val="phClr">
+                <a:tint val="15000"/>
+                <a:satMod val="350000"/>
+              </a:schemeClr>
+            </a:gs>
+          </a:gsLst>
+          <a:lin ang="16200000" scaled="1"/>
+        </a:gradFill>
+        <a:gradFill rotWithShape="1">
+          <a:gsLst>
+            <a:gs pos="0">
+              <a:schemeClr val="phClr">
+                <a:tint val="100000"/>
+                <a:shade val="100000"/>
+                <a:satMod val="130000"/>
+              </a:schemeClr>
+            </a:gs>
+            <a:gs pos="100000">
+              <a:schemeClr val="phClr">
+                <a:tint val="50000"/>
+                <a:shade val="100000"/>
+                <a:satMod val="350000"/>
+              </a:schemeClr>
+            </a:gs>
+          </a:gsLst>
+          <a:lin ang="16200000" scaled="0"/>
+        </a:gradFill>
+      </a:fillStyleLst>
+      <a:lnStyleLst>
+        <a:ln w="9525" cap="flat" cmpd="sng" algn="ctr">
+          <a:solidFill>
+            <a:schemeClr val="phClr">
+              <a:shade val="95000"/>
+              <a:satMod val="105000"/>
+            </a:schemeClr>
+          </a:solidFill>
+          <a:prstDash val="solid"/>
+        </a:ln>
+        <a:ln w="25400" cap="flat" cmpd="sng" algn="ctr">
+          <a:solidFill>
+            <a:schemeClr val="phClr"/>
+          </a:solidFill>
+          <a:prstDash val="solid"/>
+        </a:ln>
+        <a:ln w="38100" cap="flat" cmpd="sng" algn="ctr">
+          <a:solidFill>
+            <a:schemeClr val="phClr"/>
+          </a:solidFill>
+          <a:prstDash val="solid"/>
+        </a:ln>
+      </a:lnStyleLst>
+      <a:effectStyleLst>
+        <a:effectStyle>
+          <a:effectLst>
+            <a:outerShdw blurRad="40000" dist="20000" dir="5400000" rotWithShape="0">
+              <a:srgbClr val="000000">
+                <a:alpha val="38000"/>
+              </a:srgbClr>
+            </a:outerShdw>
+          </a:effectLst>
+        </a:effectStyle>
+        <a:effectStyle>
+          <a:effectLst>
+            <a:outerShdw blurRad="40000" dist="23000" dir="5400000" rotWithShape="0">
+              <a:srgbClr val="000000">
+                <a:alpha val="35000"/>
+              </a:srgbClr>
+            </a:outerShdw>
+          </a:effectLst>
+        </a:effectStyle>
+        <a:effectStyle>
+          <a:effectLst>
+            <a:outerShdw blurRad="40000" dist="23000" dir="5400000" rotWithShape="0">
+              <a:srgbClr val="000000">
+                <a:alpha val="35000"/>
+              </a:srgbClr>
+            </a:outerShdw>
+          </a:effectLst>
+          <a:scene3d>
+            <a:camera prst="orthographicFront">
+              <a:rot lat="0" lon="0" rev="0"/>
+            </a:camera>
+            <a:lightRig rig="threePt" dir="t">
+              <a:rot lat="0" lon="0" rev="1200000"/>
+            </a:lightRig>
+          </a:scene3d>
+          <a:sp3d>
+            <a:bevelT w="63500" h="25400"/>
+          </a:sp3d>
+        </a:effectStyle>
+      </a:effectStyleLst>
+      <a:bgFillStyleLst>
+        <a:solidFill>
+          <a:schemeClr val="phClr"/>
+        </a:solidFill>
+        <a:gradFill rotWithShape="1">
+          <a:gsLst>
+            <a:gs pos="0">
+              <a:schemeClr val="phClr">
+                <a:tint val="40000"/>
+                <a:satMod val="350000"/>
+              </a:schemeClr>
+            </a:gs>
+            <a:gs pos="40000">
+              <a:schemeClr val="phClr">
+                <a:tint val="45000"/>
+                <a:shade val="99000"/>
+                <a:satMod val="350000"/>
+              </a:schemeClr>
+            </a:gs>
+            <a:gs pos="100000">
+              <a:schemeClr val="phClr">
+                <a:shade val="20000"/>
+                <a:satMod val="255000"/>
+              </a:schemeClr>
+            </a:gs>
+          </a:gsLst>
+          <a:path path="circle">
+            <a:fillToRect l="50000" t="-80000" r="50000" b="180000"/>
+          </a:path>
+        </a:gradFill>
+        <a:gradFill rotWithShape="1">
+          <a:gsLst>
+            <a:gs pos="0">
+              <a:schemeClr val="phClr">
+                <a:tint val="80000"/>
+                <a:satMod val="300000"/>
+              </a:schemeClr>
+            </a:gs>
+            <a:gs pos="100000">
+              <a:schemeClr val="phClr">
+                <a:shade val="30000"/>
+                <a:satMod val="200000"/>
+              </a:schemeClr>
+            </a:gs>
+          </a:gsLst>
+          <a:path path="circle">
+            <a:fillToRect l="50000" t="50000" r="50000" b="50000"/>
+          </a:path>
+        </a:gradFill>
+      </a:bgFillStyleLst>
+    </a:fmtScheme>
+  </a:themeElements>
+  <a:objectDefaults>
+    <a:spDef>
+      <a:spPr/>
+      <a:bodyPr/>
+      <a:lstStyle/>
+      <a:style>
+        <a:lnRef idx="1">
+          <a:schemeClr val="accent1"/>
+        </a:lnRef>
+        <a:fillRef idx="3">
+          <a:schemeClr val="accent1"/>
+        </a:fillRef>
+        <a:effectRef idx="2">
+          <a:schemeClr val="accent1"/>
+        </a:effectRef>
+        <a:fontRef idx="minor">
+          <a:schemeClr val="lt1"/>
+        </a:fontRef>
+      </a:style>
+    </a:spDef>
+    <a:lnDef>
+      <a:spPr/>
+      <a:bodyPr/>
+      <a:lstStyle/>
+      <a:style>
+        <a:lnRef idx="2">
+          <a:schemeClr val="accent1"/>
+        </a:lnRef>
+        <a:fillRef idx="0">
+          <a:schemeClr val="accent1"/>
+        </a:fillRef>
+        <a:effectRef idx="1">
+          <a:schemeClr val="accent1"/>
+        </a:effectRef>
+        <a:fontRef idx="minor">
+          <a:schemeClr val="tx1"/>
+        </a:fontRef>
+      </a:style>
+    </a:lnDef>
+  </a:objectDefaults>
+  <a:extraClrSchemeLst/>
+</a:theme>
 </file>
</xml_diff>

<commit_message>
Cahier des charges initialisé
</commit_message>
<xml_diff>
--- a/Presentation 29 avril V2.pptx
+++ b/Presentation 29 avril V2.pptx
@@ -16,8 +16,8 @@
     <p:sldId id="259" r:id="rId7"/>
     <p:sldId id="262" r:id="rId8"/>
     <p:sldId id="263" r:id="rId9"/>
-    <p:sldId id="265" r:id="rId10"/>
-    <p:sldId id="260" r:id="rId11"/>
+    <p:sldId id="271" r:id="rId10"/>
+    <p:sldId id="272" r:id="rId11"/>
   </p:sldIdLst>
   <p:sldSz cx="9144000" cy="6858000" type="screen4x3"/>
   <p:notesSz cx="6858000" cy="9144000"/>
@@ -118,7 +118,7 @@
   </p:defaultTextStyle>
   <p:extLst>
     <p:ext uri="{EFAFB233-063F-42B5-8137-9DF3F51BA10A}">
-      <p15:sldGuideLst xmlns="" xmlns:p15="http://schemas.microsoft.com/office/powerpoint/2012/main">
+      <p15:sldGuideLst xmlns:p15="http://schemas.microsoft.com/office/powerpoint/2012/main" xmlns="">
         <p15:guide id="1" orient="horz" pos="2160">
           <p15:clr>
             <a:srgbClr val="A4A3A4"/>
@@ -771,7 +771,7 @@
             <a:fld id="{75D48070-6A81-47D0-9810-1540B9FEFF61}" type="datetime1">
               <a:rPr lang="en-US" smtClean="0"/>
               <a:pPr/>
-              <a:t>28/04/16</a:t>
+              <a:t>29/04/16</a:t>
             </a:fld>
             <a:endParaRPr lang="en-US"/>
           </a:p>
@@ -1227,7 +1227,7 @@
             <a:fld id="{75D48070-6A81-47D0-9810-1540B9FEFF61}" type="datetime1">
               <a:rPr lang="en-US" smtClean="0"/>
               <a:pPr/>
-              <a:t>28/04/16</a:t>
+              <a:t>29/04/16</a:t>
             </a:fld>
             <a:endParaRPr lang="en-US"/>
           </a:p>
@@ -1773,7 +1773,7 @@
             <a:fld id="{75D48070-6A81-47D0-9810-1540B9FEFF61}" type="datetime1">
               <a:rPr lang="en-US" smtClean="0"/>
               <a:pPr/>
-              <a:t>28/04/16</a:t>
+              <a:t>29/04/16</a:t>
             </a:fld>
             <a:endParaRPr lang="en-US"/>
           </a:p>
@@ -1912,7 +1912,7 @@
             <a:fld id="{75D48070-6A81-47D0-9810-1540B9FEFF61}" type="datetime1">
               <a:rPr lang="en-US" smtClean="0"/>
               <a:pPr/>
-              <a:t>28/04/16</a:t>
+              <a:t>29/04/16</a:t>
             </a:fld>
             <a:endParaRPr lang="en-US"/>
           </a:p>
@@ -2253,7 +2253,7 @@
             <a:fld id="{75D48070-6A81-47D0-9810-1540B9FEFF61}" type="datetime1">
               <a:rPr lang="en-US" smtClean="0"/>
               <a:pPr/>
-              <a:t>28/04/16</a:t>
+              <a:t>29/04/16</a:t>
             </a:fld>
             <a:endParaRPr lang="en-US"/>
           </a:p>
@@ -2581,7 +2581,7 @@
             <a:fld id="{75D48070-6A81-47D0-9810-1540B9FEFF61}" type="datetime1">
               <a:rPr lang="en-US" smtClean="0"/>
               <a:pPr/>
-              <a:t>28/04/16</a:t>
+              <a:t>29/04/16</a:t>
             </a:fld>
             <a:endParaRPr lang="en-US"/>
           </a:p>
@@ -2882,7 +2882,7 @@
             <a:fld id="{75D48070-6A81-47D0-9810-1540B9FEFF61}" type="datetime1">
               <a:rPr lang="en-US" smtClean="0"/>
               <a:pPr/>
-              <a:t>28/04/16</a:t>
+              <a:t>29/04/16</a:t>
             </a:fld>
             <a:endParaRPr lang="en-US"/>
           </a:p>
@@ -3272,7 +3272,7 @@
             <a:fld id="{75D48070-6A81-47D0-9810-1540B9FEFF61}" type="datetime1">
               <a:rPr lang="en-US" smtClean="0"/>
               <a:pPr/>
-              <a:t>28/04/16</a:t>
+              <a:t>29/04/16</a:t>
             </a:fld>
             <a:endParaRPr lang="en-US"/>
           </a:p>
@@ -3695,7 +3695,7 @@
             <a:fld id="{75D48070-6A81-47D0-9810-1540B9FEFF61}" type="datetime1">
               <a:rPr lang="en-US" smtClean="0"/>
               <a:pPr/>
-              <a:t>28/04/16</a:t>
+              <a:t>29/04/16</a:t>
             </a:fld>
             <a:endParaRPr lang="en-US"/>
           </a:p>
@@ -4246,7 +4246,7 @@
             <a:fld id="{75D48070-6A81-47D0-9810-1540B9FEFF61}" type="datetime1">
               <a:rPr lang="en-US" smtClean="0"/>
               <a:pPr/>
-              <a:t>28/04/16</a:t>
+              <a:t>29/04/16</a:t>
             </a:fld>
             <a:endParaRPr lang="en-US"/>
           </a:p>
@@ -4607,7 +4607,7 @@
             <a:fld id="{75D48070-6A81-47D0-9810-1540B9FEFF61}" type="datetime1">
               <a:rPr lang="en-US" smtClean="0"/>
               <a:pPr/>
-              <a:t>28/04/16</a:t>
+              <a:t>29/04/16</a:t>
             </a:fld>
             <a:endParaRPr lang="en-US"/>
           </a:p>
@@ -4825,7 +4825,7 @@
             <a:fld id="{75D48070-6A81-47D0-9810-1540B9FEFF61}" type="datetime1">
               <a:rPr lang="en-US" smtClean="0"/>
               <a:pPr/>
-              <a:t>28/04/16</a:t>
+              <a:t>29/04/16</a:t>
             </a:fld>
             <a:endParaRPr lang="en-US"/>
           </a:p>
@@ -5135,7 +5135,7 @@
             <a:fld id="{75D48070-6A81-47D0-9810-1540B9FEFF61}" type="datetime1">
               <a:rPr lang="en-US" smtClean="0"/>
               <a:pPr/>
-              <a:t>28/04/16</a:t>
+              <a:t>29/04/16</a:t>
             </a:fld>
             <a:endParaRPr lang="en-US"/>
           </a:p>
@@ -5394,7 +5394,7 @@
             <a:fld id="{75D48070-6A81-47D0-9810-1540B9FEFF61}" type="datetime1">
               <a:rPr lang="en-US" smtClean="0"/>
               <a:pPr/>
-              <a:t>28/04/16</a:t>
+              <a:t>29/04/16</a:t>
             </a:fld>
             <a:endParaRPr lang="en-US"/>
           </a:p>
@@ -5786,7 +5786,7 @@
             <a:fld id="{75D48070-6A81-47D0-9810-1540B9FEFF61}" type="datetime1">
               <a:rPr lang="en-US" smtClean="0"/>
               <a:pPr/>
-              <a:t>28/04/16</a:t>
+              <a:t>29/04/16</a:t>
             </a:fld>
             <a:endParaRPr lang="en-US"/>
           </a:p>
@@ -6377,7 +6377,7 @@
             <a:fld id="{75D48070-6A81-47D0-9810-1540B9FEFF61}" type="datetime1">
               <a:rPr lang="en-US" smtClean="0"/>
               <a:pPr/>
-              <a:t>28/04/16</a:t>
+              <a:t>29/04/16</a:t>
             </a:fld>
             <a:endParaRPr lang="en-US"/>
           </a:p>
@@ -6895,7 +6895,7 @@
             <a:fld id="{75D48070-6A81-47D0-9810-1540B9FEFF61}" type="datetime1">
               <a:rPr lang="en-US" smtClean="0"/>
               <a:pPr/>
-              <a:t>28/04/16</a:t>
+              <a:t>29/04/16</a:t>
             </a:fld>
             <a:endParaRPr lang="en-US"/>
           </a:p>
@@ -7271,7 +7271,7 @@
             <a:fld id="{75D48070-6A81-47D0-9810-1540B9FEFF61}" type="datetime1">
               <a:rPr lang="en-US" smtClean="0"/>
               <a:pPr/>
-              <a:t>28/04/16</a:t>
+              <a:t>29/04/16</a:t>
             </a:fld>
             <a:endParaRPr lang="en-US"/>
           </a:p>
@@ -7673,7 +7673,7 @@
             <a:fld id="{75D48070-6A81-47D0-9810-1540B9FEFF61}" type="datetime1">
               <a:rPr lang="en-US" smtClean="0"/>
               <a:pPr/>
-              <a:t>28/04/16</a:t>
+              <a:t>29/04/16</a:t>
             </a:fld>
             <a:endParaRPr lang="en-US"/>
           </a:p>
@@ -8096,7 +8096,7 @@
             <a:fld id="{75D48070-6A81-47D0-9810-1540B9FEFF61}" type="datetime1">
               <a:rPr lang="en-US" smtClean="0"/>
               <a:pPr/>
-              <a:t>28/04/16</a:t>
+              <a:t>29/04/16</a:t>
             </a:fld>
             <a:endParaRPr lang="en-US"/>
           </a:p>
@@ -8482,7 +8482,7 @@
             <a:fld id="{75D48070-6A81-47D0-9810-1540B9FEFF61}" type="datetime1">
               <a:rPr lang="en-US" smtClean="0"/>
               <a:pPr/>
-              <a:t>28/04/16</a:t>
+              <a:t>29/04/16</a:t>
             </a:fld>
             <a:endParaRPr lang="en-US"/>
           </a:p>
@@ -9095,7 +9095,7 @@
           <p:nvPr>
             <p:extLst>
               <p:ext uri="{D42A27DB-BD31-4B8C-83A1-F6EECF244321}">
-                <p14:modId xmlns:p14="http://schemas.microsoft.com/office/powerpoint/2010/main" val="3609631992"/>
+                <p14:modId xmlns:p14="http://schemas.microsoft.com/office/powerpoint/2010/main" val="1261412885"/>
               </p:ext>
             </p:extLst>
           </p:nvPr>
@@ -9516,7 +9516,7 @@
                     <a:p>
                       <a:pPr algn="l" fontAlgn="b"/>
                       <a:r>
-                        <a:rPr lang="en-US" sz="1600" b="0" i="0" u="none" strike="noStrike">
+                        <a:rPr lang="en-US" sz="1600" b="0" i="0" u="none" strike="noStrike" dirty="0">
                           <a:solidFill>
                             <a:srgbClr val="000000"/>
                           </a:solidFill>
@@ -9824,7 +9824,7 @@
                           <a:effectLst/>
                           <a:latin typeface="Calibri"/>
                         </a:rPr>
-                        <a:t>50</a:t>
+                        <a:t>57</a:t>
                       </a:r>
                       <a:endParaRPr lang="en-US" sz="1600" b="0" i="0" u="none" strike="noStrike" dirty="0">
                         <a:solidFill>
@@ -10011,7 +10011,7 @@
                           <a:effectLst/>
                           <a:latin typeface="Calibri"/>
                         </a:rPr>
-                        <a:t>17</a:t>
+                        <a:t>10</a:t>
                       </a:r>
                       <a:endParaRPr lang="en-US" sz="1600" b="0" i="0" u="none" strike="noStrike" dirty="0">
                         <a:solidFill>
@@ -10457,7 +10457,7 @@
     </p:spTree>
     <p:extLst>
       <p:ext uri="{BB962C8B-B14F-4D97-AF65-F5344CB8AC3E}">
-        <p14:creationId xmlns:p14="http://schemas.microsoft.com/office/powerpoint/2010/main" val="2481418858"/>
+        <p14:creationId xmlns:p14="http://schemas.microsoft.com/office/powerpoint/2010/main" val="3165694961"/>
       </p:ext>
     </p:extLst>
   </p:cSld>
@@ -10546,11 +10546,7 @@
             </a:pPr>
             <a:r>
               <a:rPr lang="en-US" dirty="0" smtClean="0"/>
-              <a:t>Note </a:t>
-            </a:r>
-            <a:r>
-              <a:rPr lang="en-US" dirty="0" smtClean="0"/>
-              <a:t>de </a:t>
+              <a:t>Note de </a:t>
             </a:r>
             <a:r>
               <a:rPr lang="en-US" dirty="0" err="1" smtClean="0"/>
@@ -11007,11 +11003,7 @@
           <a:p>
             <a:r>
               <a:rPr lang="en-US" dirty="0" smtClean="0"/>
-              <a:t>NOTE DE </a:t>
-            </a:r>
-            <a:r>
-              <a:rPr lang="en-US" dirty="0" smtClean="0"/>
-              <a:t>CADRAGE</a:t>
+              <a:t>NOTE DE CADRAGE</a:t>
             </a:r>
             <a:endParaRPr lang="en-US" dirty="0"/>
           </a:p>
@@ -11132,15 +11124,7 @@
             </a:r>
             <a:r>
               <a:rPr lang="en-US" sz="1600" dirty="0" smtClean="0"/>
-              <a:t> </a:t>
-            </a:r>
-            <a:r>
-              <a:rPr lang="en-US" sz="1600" dirty="0" smtClean="0"/>
-              <a:t>du </a:t>
-            </a:r>
-            <a:r>
-              <a:rPr lang="en-US" sz="1600" dirty="0" smtClean="0"/>
-              <a:t>site </a:t>
+              <a:t> du site </a:t>
             </a:r>
             <a:r>
               <a:rPr lang="en-US" sz="1600" dirty="0" err="1" smtClean="0"/>
@@ -11148,11 +11132,7 @@
             </a:r>
             <a:r>
               <a:rPr lang="en-US" sz="1600" dirty="0" smtClean="0"/>
-              <a:t> de prêt-à-</a:t>
-            </a:r>
-            <a:r>
-              <a:rPr lang="en-US" sz="1600" dirty="0" smtClean="0"/>
-              <a:t>porter et de </a:t>
+              <a:t> de prêt-à-porter et de </a:t>
             </a:r>
             <a:r>
               <a:rPr lang="en-US" sz="1600" dirty="0" err="1" smtClean="0"/>
@@ -11540,7 +11520,6 @@
               <a:rPr lang="en-US" sz="1600" dirty="0" smtClean="0"/>
               <a:t>temps</a:t>
             </a:r>
-            <a:endParaRPr lang="en-US" sz="1600" dirty="0" smtClean="0"/>
           </a:p>
           <a:p>
             <a:pPr marL="0" indent="0">
@@ -11962,38 +11941,125 @@
           </a:p>
         </p:txBody>
       </p:sp>
-      <p:pic>
-        <p:nvPicPr>
-          <p:cNvPr id="4" name="Espace réservé du contenu 3"/>
-          <p:cNvPicPr>
-            <a:picLocks noGrp="1" noChangeAspect="1"/>
-          </p:cNvPicPr>
+      <p:graphicFrame>
+        <p:nvGraphicFramePr>
+          <p:cNvPr id="5" name="Espace réservé du contenu 4"/>
+          <p:cNvGraphicFramePr>
+            <a:graphicFrameLocks noGrp="1" noChangeAspect="1"/>
+          </p:cNvGraphicFramePr>
           <p:nvPr>
             <p:ph idx="1"/>
-          </p:nvPr>
-        </p:nvPicPr>
-        <p:blipFill rotWithShape="1">
-          <a:blip r:embed="rId2" cstate="email">
-            <a:extLst>
-              <a:ext uri="{28A0092B-C50C-407E-A947-70E740481C1C}">
-                <a14:useLocalDpi xmlns:a14="http://schemas.microsoft.com/office/drawing/2010/main" val="0"/>
-              </a:ext>
-            </a:extLst>
-          </a:blip>
-          <a:srcRect t="-1699" r="32983" b="27490"/>
-          <a:stretch/>
-        </p:blipFill>
-        <p:spPr>
-          <a:xfrm>
-            <a:off x="498475" y="2425700"/>
-            <a:ext cx="7926454" cy="3657599"/>
-          </a:xfrm>
-        </p:spPr>
-      </p:pic>
+            <p:extLst>
+              <p:ext uri="{D42A27DB-BD31-4B8C-83A1-F6EECF244321}">
+                <p14:modId xmlns:p14="http://schemas.microsoft.com/office/powerpoint/2010/main" val="3953463049"/>
+              </p:ext>
+            </p:extLst>
+          </p:nvPr>
+        </p:nvGraphicFramePr>
+        <p:xfrm>
+          <a:off x="323850" y="1879600"/>
+          <a:ext cx="5880100" cy="3776663"/>
+        </p:xfrm>
+        <a:graphic>
+          <a:graphicData uri="http://schemas.openxmlformats.org/presentationml/2006/ole">
+            <mc:AlternateContent xmlns:mc="http://schemas.openxmlformats.org/markup-compatibility/2006">
+              <mc:Choice xmlns:v="urn:schemas-microsoft-com:vml" Requires="v">
+                <p:oleObj spid="_x0000_s1025" name="Feuille de calcul" r:id="rId4" imgW="5353105" imgH="3438523" progId="Excel.Sheet.12">
+                  <p:embed/>
+                </p:oleObj>
+              </mc:Choice>
+              <mc:Fallback>
+                <p:oleObj name="Feuille de calcul" r:id="rId4" imgW="5353105" imgH="3438523" progId="Excel.Sheet.12">
+                  <p:embed/>
+                  <p:pic>
+                    <p:nvPicPr>
+                      <p:cNvPr id="0" name=""/>
+                      <p:cNvPicPr/>
+                      <p:nvPr/>
+                    </p:nvPicPr>
+                    <p:blipFill>
+                      <a:blip r:embed="rId5"/>
+                      <a:stretch>
+                        <a:fillRect/>
+                      </a:stretch>
+                    </p:blipFill>
+                    <p:spPr>
+                      <a:xfrm>
+                        <a:off x="323850" y="1879600"/>
+                        <a:ext cx="5880100" cy="3776663"/>
+                      </a:xfrm>
+                      <a:prstGeom prst="rect">
+                        <a:avLst/>
+                      </a:prstGeom>
+                    </p:spPr>
+                  </p:pic>
+                </p:oleObj>
+              </mc:Fallback>
+            </mc:AlternateContent>
+          </a:graphicData>
+        </a:graphic>
+      </p:graphicFrame>
+      <p:graphicFrame>
+        <p:nvGraphicFramePr>
+          <p:cNvPr id="6" name="Objet 5"/>
+          <p:cNvGraphicFramePr>
+            <a:graphicFrameLocks noChangeAspect="1"/>
+          </p:cNvGraphicFramePr>
+          <p:nvPr>
+            <p:extLst>
+              <p:ext uri="{D42A27DB-BD31-4B8C-83A1-F6EECF244321}">
+                <p14:modId xmlns:p14="http://schemas.microsoft.com/office/powerpoint/2010/main" val="3385394501"/>
+              </p:ext>
+            </p:extLst>
+          </p:nvPr>
+        </p:nvGraphicFramePr>
+        <p:xfrm>
+          <a:off x="6683375" y="3096418"/>
+          <a:ext cx="1533525" cy="1343025"/>
+        </p:xfrm>
+        <a:graphic>
+          <a:graphicData uri="http://schemas.openxmlformats.org/presentationml/2006/ole">
+            <mc:AlternateContent xmlns:mc="http://schemas.openxmlformats.org/markup-compatibility/2006">
+              <mc:Choice xmlns:v="urn:schemas-microsoft-com:vml" Requires="v">
+                <p:oleObj spid="_x0000_s1026" name="Feuille de calcul" r:id="rId6" imgW="1533349" imgH="1342889" progId="Excel.Sheet.12">
+                  <p:embed/>
+                </p:oleObj>
+              </mc:Choice>
+              <mc:Fallback>
+                <p:oleObj name="Feuille de calcul" r:id="rId6" imgW="1533349" imgH="1342889" progId="Excel.Sheet.12">
+                  <p:embed/>
+                  <p:pic>
+                    <p:nvPicPr>
+                      <p:cNvPr id="0" name=""/>
+                      <p:cNvPicPr/>
+                      <p:nvPr/>
+                    </p:nvPicPr>
+                    <p:blipFill>
+                      <a:blip r:embed="rId7"/>
+                      <a:stretch>
+                        <a:fillRect/>
+                      </a:stretch>
+                    </p:blipFill>
+                    <p:spPr>
+                      <a:xfrm>
+                        <a:off x="6683375" y="3096418"/>
+                        <a:ext cx="1533525" cy="1343025"/>
+                      </a:xfrm>
+                      <a:prstGeom prst="rect">
+                        <a:avLst/>
+                      </a:prstGeom>
+                    </p:spPr>
+                  </p:pic>
+                </p:oleObj>
+              </mc:Fallback>
+            </mc:AlternateContent>
+          </a:graphicData>
+        </a:graphic>
+      </p:graphicFrame>
     </p:spTree>
     <p:extLst>
       <p:ext uri="{BB962C8B-B14F-4D97-AF65-F5344CB8AC3E}">
-        <p14:creationId xmlns:p14="http://schemas.microsoft.com/office/powerpoint/2010/main" val="359778942"/>
+        <p14:creationId xmlns:p14="http://schemas.microsoft.com/office/powerpoint/2010/main" val="1611412759"/>
       </p:ext>
     </p:extLst>
   </p:cSld>

</xml_diff>